<commit_message>
more additions, shape taking place....
</commit_message>
<xml_diff>
--- a/Cloud and Distributed Architecture Overview.pptx
+++ b/Cloud and Distributed Architecture Overview.pptx
@@ -14,6 +14,13 @@
     <p:sldId id="261" r:id="rId8"/>
     <p:sldId id="262" r:id="rId9"/>
     <p:sldId id="263" r:id="rId10"/>
+    <p:sldId id="265" r:id="rId11"/>
+    <p:sldId id="266" r:id="rId12"/>
+    <p:sldId id="267" r:id="rId13"/>
+    <p:sldId id="268" r:id="rId14"/>
+    <p:sldId id="269" r:id="rId15"/>
+    <p:sldId id="270" r:id="rId16"/>
+    <p:sldId id="271" r:id="rId17"/>
   </p:sldIdLst>
   <p:sldSz cx="10080625" cy="7559675"/>
   <p:notesSz cx="7772400" cy="10058400"/>
@@ -6552,6 +6559,3152 @@
 </p:sld>
 </file>
 
+<file path=ppt/slides/slide10.xml><?xml version="1.0" encoding="utf-8"?>
+<p:sld xmlns:a="http://schemas.openxmlformats.org/drawingml/2006/main" xmlns:r="http://schemas.openxmlformats.org/officeDocument/2006/relationships" xmlns:p="http://schemas.openxmlformats.org/presentationml/2006/main">
+  <p:cSld>
+    <p:spTree>
+      <p:nvGrpSpPr>
+        <p:cNvPr id="1" name=""/>
+        <p:cNvGrpSpPr/>
+        <p:nvPr/>
+      </p:nvGrpSpPr>
+      <p:grpSpPr>
+        <a:xfrm>
+          <a:off x="0" y="0"/>
+          <a:ext cx="0" cy="0"/>
+          <a:chOff x="0" y="0"/>
+          <a:chExt cx="0" cy="0"/>
+        </a:xfrm>
+      </p:grpSpPr>
+      <p:sp>
+        <p:nvSpPr>
+          <p:cNvPr id="2" name="Title 1"/>
+          <p:cNvSpPr>
+            <a:spLocks noGrp="1"/>
+          </p:cNvSpPr>
+          <p:nvPr>
+            <p:ph type="title"/>
+          </p:nvPr>
+        </p:nvSpPr>
+        <p:spPr/>
+        <p:txBody>
+          <a:bodyPr/>
+          <a:lstStyle/>
+          <a:p>
+            <a:r>
+              <a:rPr lang="en-US" dirty="0" smtClean="0"/>
+              <a:t>The Chaos Monkey Lives!!!</a:t>
+            </a:r>
+            <a:endParaRPr lang="en-US" dirty="0"/>
+          </a:p>
+        </p:txBody>
+      </p:sp>
+      <p:pic>
+        <p:nvPicPr>
+          <p:cNvPr id="1026" name="Picture 2"/>
+          <p:cNvPicPr>
+            <a:picLocks noChangeAspect="1" noChangeArrowheads="1"/>
+          </p:cNvPicPr>
+          <p:nvPr/>
+        </p:nvPicPr>
+        <p:blipFill>
+          <a:blip r:embed="rId2">
+            <a:extLst>
+              <a:ext uri="{28A0092B-C50C-407E-A947-70E740481C1C}">
+                <a14:useLocalDpi xmlns:a14="http://schemas.microsoft.com/office/drawing/2010/main" val="0"/>
+              </a:ext>
+            </a:extLst>
+          </a:blip>
+          <a:srcRect/>
+          <a:stretch>
+            <a:fillRect/>
+          </a:stretch>
+        </p:blipFill>
+        <p:spPr bwMode="auto">
+          <a:xfrm>
+            <a:off x="1302473" y="1695678"/>
+            <a:ext cx="7475679" cy="4168321"/>
+          </a:xfrm>
+          <a:prstGeom prst="rect">
+            <a:avLst/>
+          </a:prstGeom>
+          <a:noFill/>
+          <a:ln>
+            <a:noFill/>
+          </a:ln>
+          <a:effectLst/>
+          <a:extLst>
+            <a:ext uri="{909E8E84-426E-40DD-AFC4-6F175D3DCCD1}">
+              <a14:hiddenFill xmlns:a14="http://schemas.microsoft.com/office/drawing/2010/main">
+                <a:solidFill>
+                  <a:schemeClr val="accent1"/>
+                </a:solidFill>
+              </a14:hiddenFill>
+            </a:ext>
+            <a:ext uri="{91240B29-F687-4F45-9708-019B960494DF}">
+              <a14:hiddenLine xmlns:a14="http://schemas.microsoft.com/office/drawing/2010/main" w="9525">
+                <a:solidFill>
+                  <a:schemeClr val="tx1"/>
+                </a:solidFill>
+                <a:miter lim="800000"/>
+                <a:headEnd/>
+                <a:tailEnd/>
+              </a14:hiddenLine>
+            </a:ext>
+            <a:ext uri="{AF507438-7753-43E0-B8FC-AC1667EBCBE1}">
+              <a14:hiddenEffects xmlns:a14="http://schemas.microsoft.com/office/drawing/2010/main">
+                <a:effectLst>
+                  <a:outerShdw dist="35921" dir="2700000" algn="ctr" rotWithShape="0">
+                    <a:schemeClr val="bg2"/>
+                  </a:outerShdw>
+                </a:effectLst>
+              </a14:hiddenEffects>
+            </a:ext>
+          </a:extLst>
+        </p:spPr>
+      </p:pic>
+    </p:spTree>
+    <p:extLst>
+      <p:ext uri="{BB962C8B-B14F-4D97-AF65-F5344CB8AC3E}">
+        <p14:creationId xmlns:p14="http://schemas.microsoft.com/office/powerpoint/2010/main" val="811675509"/>
+      </p:ext>
+    </p:extLst>
+  </p:cSld>
+  <p:clrMapOvr>
+    <a:masterClrMapping/>
+  </p:clrMapOvr>
+  <mc:AlternateContent xmlns:mc="http://schemas.openxmlformats.org/markup-compatibility/2006">
+    <mc:Choice xmlns:p14="http://schemas.microsoft.com/office/powerpoint/2010/main" Requires="p14">
+      <p:transition spd="slow" p14:dur="2000"/>
+    </mc:Choice>
+    <mc:Fallback>
+      <p:transition spd="slow"/>
+    </mc:Fallback>
+  </mc:AlternateContent>
+  <p:timing>
+    <p:tnLst>
+      <p:par>
+        <p:cTn id="1" dur="indefinite" restart="never" nodeType="tmRoot"/>
+      </p:par>
+    </p:tnLst>
+  </p:timing>
+</p:sld>
+</file>
+
+<file path=ppt/slides/slide11.xml><?xml version="1.0" encoding="utf-8"?>
+<p:sld xmlns:a="http://schemas.openxmlformats.org/drawingml/2006/main" xmlns:r="http://schemas.openxmlformats.org/officeDocument/2006/relationships" xmlns:p="http://schemas.openxmlformats.org/presentationml/2006/main">
+  <p:cSld>
+    <p:spTree>
+      <p:nvGrpSpPr>
+        <p:cNvPr id="1" name=""/>
+        <p:cNvGrpSpPr/>
+        <p:nvPr/>
+      </p:nvGrpSpPr>
+      <p:grpSpPr>
+        <a:xfrm>
+          <a:off x="0" y="0"/>
+          <a:ext cx="0" cy="0"/>
+          <a:chOff x="0" y="0"/>
+          <a:chExt cx="0" cy="0"/>
+        </a:xfrm>
+      </p:grpSpPr>
+      <p:pic>
+        <p:nvPicPr>
+          <p:cNvPr id="1026" name="Picture 2"/>
+          <p:cNvPicPr>
+            <a:picLocks noChangeAspect="1" noChangeArrowheads="1"/>
+          </p:cNvPicPr>
+          <p:nvPr/>
+        </p:nvPicPr>
+        <p:blipFill>
+          <a:blip r:embed="rId2">
+            <a:extLst>
+              <a:ext uri="{28A0092B-C50C-407E-A947-70E740481C1C}">
+                <a14:useLocalDpi xmlns:a14="http://schemas.microsoft.com/office/drawing/2010/main" val="0"/>
+              </a:ext>
+            </a:extLst>
+          </a:blip>
+          <a:srcRect/>
+          <a:stretch>
+            <a:fillRect/>
+          </a:stretch>
+        </p:blipFill>
+        <p:spPr bwMode="auto">
+          <a:xfrm>
+            <a:off x="142274" y="488230"/>
+            <a:ext cx="9796079" cy="6583217"/>
+          </a:xfrm>
+          <a:prstGeom prst="rect">
+            <a:avLst/>
+          </a:prstGeom>
+          <a:noFill/>
+          <a:ln>
+            <a:noFill/>
+          </a:ln>
+          <a:effectLst/>
+          <a:extLst>
+            <a:ext uri="{909E8E84-426E-40DD-AFC4-6F175D3DCCD1}">
+              <a14:hiddenFill xmlns:a14="http://schemas.microsoft.com/office/drawing/2010/main">
+                <a:solidFill>
+                  <a:schemeClr val="accent1"/>
+                </a:solidFill>
+              </a14:hiddenFill>
+            </a:ext>
+            <a:ext uri="{91240B29-F687-4F45-9708-019B960494DF}">
+              <a14:hiddenLine xmlns:a14="http://schemas.microsoft.com/office/drawing/2010/main" w="9525">
+                <a:solidFill>
+                  <a:schemeClr val="tx1"/>
+                </a:solidFill>
+                <a:miter lim="800000"/>
+                <a:headEnd/>
+                <a:tailEnd/>
+              </a14:hiddenLine>
+            </a:ext>
+            <a:ext uri="{AF507438-7753-43E0-B8FC-AC1667EBCBE1}">
+              <a14:hiddenEffects xmlns:a14="http://schemas.microsoft.com/office/drawing/2010/main">
+                <a:effectLst>
+                  <a:outerShdw dist="35921" dir="2700000" algn="ctr" rotWithShape="0">
+                    <a:schemeClr val="bg2"/>
+                  </a:outerShdw>
+                </a:effectLst>
+              </a14:hiddenEffects>
+            </a:ext>
+          </a:extLst>
+        </p:spPr>
+      </p:pic>
+    </p:spTree>
+    <p:extLst>
+      <p:ext uri="{BB962C8B-B14F-4D97-AF65-F5344CB8AC3E}">
+        <p14:creationId xmlns:p14="http://schemas.microsoft.com/office/powerpoint/2010/main" val="3620993328"/>
+      </p:ext>
+    </p:extLst>
+  </p:cSld>
+  <p:clrMapOvr>
+    <a:masterClrMapping/>
+  </p:clrMapOvr>
+  <mc:AlternateContent xmlns:mc="http://schemas.openxmlformats.org/markup-compatibility/2006">
+    <mc:Choice xmlns:p14="http://schemas.microsoft.com/office/powerpoint/2010/main" Requires="p14">
+      <p:transition spd="slow" p14:dur="2000"/>
+    </mc:Choice>
+    <mc:Fallback>
+      <p:transition spd="slow"/>
+    </mc:Fallback>
+  </mc:AlternateContent>
+  <p:timing>
+    <p:tnLst>
+      <p:par>
+        <p:cTn id="1" dur="indefinite" restart="never" nodeType="tmRoot"/>
+      </p:par>
+    </p:tnLst>
+  </p:timing>
+</p:sld>
+</file>
+
+<file path=ppt/slides/slide12.xml><?xml version="1.0" encoding="utf-8"?>
+<p:sld xmlns:a="http://schemas.openxmlformats.org/drawingml/2006/main" xmlns:r="http://schemas.openxmlformats.org/officeDocument/2006/relationships" xmlns:p="http://schemas.openxmlformats.org/presentationml/2006/main">
+  <p:cSld>
+    <p:spTree>
+      <p:nvGrpSpPr>
+        <p:cNvPr id="1" name=""/>
+        <p:cNvGrpSpPr/>
+        <p:nvPr/>
+      </p:nvGrpSpPr>
+      <p:grpSpPr>
+        <a:xfrm>
+          <a:off x="0" y="0"/>
+          <a:ext cx="0" cy="0"/>
+          <a:chOff x="0" y="0"/>
+          <a:chExt cx="0" cy="0"/>
+        </a:xfrm>
+      </p:grpSpPr>
+      <p:sp>
+        <p:nvSpPr>
+          <p:cNvPr id="2" name="Title 1"/>
+          <p:cNvSpPr>
+            <a:spLocks noGrp="1"/>
+          </p:cNvSpPr>
+          <p:nvPr>
+            <p:ph type="title"/>
+          </p:nvPr>
+        </p:nvSpPr>
+        <p:spPr/>
+        <p:txBody>
+          <a:bodyPr/>
+          <a:lstStyle/>
+          <a:p>
+            <a:r>
+              <a:rPr lang="en-US" dirty="0" smtClean="0"/>
+              <a:t>Point: The Clouds are one big machine</a:t>
+            </a:r>
+            <a:endParaRPr lang="en-US" dirty="0"/>
+          </a:p>
+        </p:txBody>
+      </p:sp>
+      <p:grpSp>
+        <p:nvGrpSpPr>
+          <p:cNvPr id="11" name="Group 10"/>
+          <p:cNvGrpSpPr/>
+          <p:nvPr/>
+        </p:nvGrpSpPr>
+        <p:grpSpPr>
+          <a:xfrm>
+            <a:off x="308862" y="4916775"/>
+            <a:ext cx="2638269" cy="2038662"/>
+            <a:chOff x="1154242" y="2698230"/>
+            <a:chExt cx="2638269" cy="2038662"/>
+          </a:xfrm>
+          <a:solidFill>
+            <a:schemeClr val="tx1"/>
+          </a:solidFill>
+        </p:grpSpPr>
+        <p:sp>
+          <p:nvSpPr>
+            <p:cNvPr id="6" name="Cloud 5"/>
+            <p:cNvSpPr/>
+            <p:nvPr/>
+          </p:nvSpPr>
+          <p:spPr>
+            <a:xfrm>
+              <a:off x="1154242" y="2698230"/>
+              <a:ext cx="2638269" cy="2038662"/>
+            </a:xfrm>
+            <a:prstGeom prst="cloud">
+              <a:avLst/>
+            </a:prstGeom>
+            <a:grpFill/>
+          </p:spPr>
+          <p:style>
+            <a:lnRef idx="2">
+              <a:schemeClr val="accent1">
+                <a:shade val="50000"/>
+              </a:schemeClr>
+            </a:lnRef>
+            <a:fillRef idx="1">
+              <a:schemeClr val="accent1"/>
+            </a:fillRef>
+            <a:effectRef idx="0">
+              <a:schemeClr val="accent1"/>
+            </a:effectRef>
+            <a:fontRef idx="minor">
+              <a:schemeClr val="lt1"/>
+            </a:fontRef>
+          </p:style>
+          <p:txBody>
+            <a:bodyPr rtlCol="0" anchor="ctr"/>
+            <a:lstStyle/>
+            <a:p>
+              <a:pPr algn="ctr"/>
+              <a:endParaRPr lang="en-US"/>
+            </a:p>
+          </p:txBody>
+        </p:sp>
+        <p:pic>
+          <p:nvPicPr>
+            <p:cNvPr id="7" name="Picture 6"/>
+            <p:cNvPicPr>
+              <a:picLocks noChangeAspect="1"/>
+            </p:cNvPicPr>
+            <p:nvPr/>
+          </p:nvPicPr>
+          <p:blipFill>
+            <a:blip r:embed="rId2"/>
+            <a:stretch>
+              <a:fillRect/>
+            </a:stretch>
+          </p:blipFill>
+          <p:spPr>
+            <a:xfrm>
+              <a:off x="1770757" y="3441336"/>
+              <a:ext cx="1333500" cy="552450"/>
+            </a:xfrm>
+            <a:prstGeom prst="rect">
+              <a:avLst/>
+            </a:prstGeom>
+            <a:grpFill/>
+          </p:spPr>
+        </p:pic>
+      </p:grpSp>
+      <p:grpSp>
+        <p:nvGrpSpPr>
+          <p:cNvPr id="12" name="Group 11"/>
+          <p:cNvGrpSpPr/>
+          <p:nvPr/>
+        </p:nvGrpSpPr>
+        <p:grpSpPr>
+          <a:xfrm>
+            <a:off x="7010778" y="2042863"/>
+            <a:ext cx="2638269" cy="2038662"/>
+            <a:chOff x="6103495" y="1801319"/>
+            <a:chExt cx="2638269" cy="2038662"/>
+          </a:xfrm>
+          <a:solidFill>
+            <a:schemeClr val="tx1"/>
+          </a:solidFill>
+        </p:grpSpPr>
+        <p:sp>
+          <p:nvSpPr>
+            <p:cNvPr id="4" name="Cloud 3"/>
+            <p:cNvSpPr/>
+            <p:nvPr/>
+          </p:nvSpPr>
+          <p:spPr>
+            <a:xfrm>
+              <a:off x="6103495" y="1801319"/>
+              <a:ext cx="2638269" cy="2038662"/>
+            </a:xfrm>
+            <a:prstGeom prst="cloud">
+              <a:avLst/>
+            </a:prstGeom>
+            <a:grpFill/>
+          </p:spPr>
+          <p:style>
+            <a:lnRef idx="2">
+              <a:schemeClr val="accent1">
+                <a:shade val="50000"/>
+              </a:schemeClr>
+            </a:lnRef>
+            <a:fillRef idx="1">
+              <a:schemeClr val="accent1"/>
+            </a:fillRef>
+            <a:effectRef idx="0">
+              <a:schemeClr val="accent1"/>
+            </a:effectRef>
+            <a:fontRef idx="minor">
+              <a:schemeClr val="lt1"/>
+            </a:fontRef>
+          </p:style>
+          <p:txBody>
+            <a:bodyPr rtlCol="0" anchor="ctr"/>
+            <a:lstStyle/>
+            <a:p>
+              <a:pPr algn="ctr"/>
+              <a:endParaRPr lang="en-US"/>
+            </a:p>
+          </p:txBody>
+        </p:sp>
+        <p:pic>
+          <p:nvPicPr>
+            <p:cNvPr id="8" name="Picture 7"/>
+            <p:cNvPicPr>
+              <a:picLocks noChangeAspect="1"/>
+            </p:cNvPicPr>
+            <p:nvPr/>
+          </p:nvPicPr>
+          <p:blipFill>
+            <a:blip r:embed="rId3"/>
+            <a:stretch>
+              <a:fillRect/>
+            </a:stretch>
+          </p:blipFill>
+          <p:spPr>
+            <a:xfrm>
+              <a:off x="6435999" y="2443850"/>
+              <a:ext cx="1876425" cy="609600"/>
+            </a:xfrm>
+            <a:prstGeom prst="rect">
+              <a:avLst/>
+            </a:prstGeom>
+            <a:grpFill/>
+          </p:spPr>
+        </p:pic>
+      </p:grpSp>
+      <p:grpSp>
+        <p:nvGrpSpPr>
+          <p:cNvPr id="10" name="Group 9"/>
+          <p:cNvGrpSpPr/>
+          <p:nvPr/>
+        </p:nvGrpSpPr>
+        <p:grpSpPr>
+          <a:xfrm>
+            <a:off x="3563646" y="4916775"/>
+            <a:ext cx="2638269" cy="2038662"/>
+            <a:chOff x="3104255" y="4916775"/>
+            <a:chExt cx="2638269" cy="2038662"/>
+          </a:xfrm>
+          <a:solidFill>
+            <a:schemeClr val="tx1"/>
+          </a:solidFill>
+        </p:grpSpPr>
+        <p:sp>
+          <p:nvSpPr>
+            <p:cNvPr id="3" name="Cloud 2"/>
+            <p:cNvSpPr/>
+            <p:nvPr/>
+          </p:nvSpPr>
+          <p:spPr>
+            <a:xfrm>
+              <a:off x="3104255" y="4916775"/>
+              <a:ext cx="2638269" cy="2038662"/>
+            </a:xfrm>
+            <a:prstGeom prst="cloud">
+              <a:avLst/>
+            </a:prstGeom>
+            <a:grpFill/>
+          </p:spPr>
+          <p:style>
+            <a:lnRef idx="2">
+              <a:schemeClr val="accent1">
+                <a:shade val="50000"/>
+              </a:schemeClr>
+            </a:lnRef>
+            <a:fillRef idx="1">
+              <a:schemeClr val="accent1"/>
+            </a:fillRef>
+            <a:effectRef idx="0">
+              <a:schemeClr val="accent1"/>
+            </a:effectRef>
+            <a:fontRef idx="minor">
+              <a:schemeClr val="lt1"/>
+            </a:fontRef>
+          </p:style>
+          <p:txBody>
+            <a:bodyPr rtlCol="0" anchor="ctr"/>
+            <a:lstStyle/>
+            <a:p>
+              <a:pPr algn="ctr"/>
+              <a:endParaRPr lang="en-US"/>
+            </a:p>
+          </p:txBody>
+        </p:sp>
+        <p:pic>
+          <p:nvPicPr>
+            <p:cNvPr id="9" name="Picture 8"/>
+            <p:cNvPicPr>
+              <a:picLocks noChangeAspect="1"/>
+            </p:cNvPicPr>
+            <p:nvPr/>
+          </p:nvPicPr>
+          <p:blipFill>
+            <a:blip r:embed="rId4"/>
+            <a:stretch>
+              <a:fillRect/>
+            </a:stretch>
+          </p:blipFill>
+          <p:spPr>
+            <a:xfrm>
+              <a:off x="3418503" y="5530434"/>
+              <a:ext cx="2009775" cy="590550"/>
+            </a:xfrm>
+            <a:prstGeom prst="rect">
+              <a:avLst/>
+            </a:prstGeom>
+            <a:grpFill/>
+          </p:spPr>
+        </p:pic>
+      </p:grpSp>
+      <p:grpSp>
+        <p:nvGrpSpPr>
+          <p:cNvPr id="14" name="Group 13"/>
+          <p:cNvGrpSpPr/>
+          <p:nvPr/>
+        </p:nvGrpSpPr>
+        <p:grpSpPr>
+          <a:xfrm>
+            <a:off x="6993290" y="4916775"/>
+            <a:ext cx="2638269" cy="2038662"/>
+            <a:chOff x="6993290" y="4916775"/>
+            <a:chExt cx="2638269" cy="2038662"/>
+          </a:xfrm>
+          <a:solidFill>
+            <a:schemeClr val="tx1"/>
+          </a:solidFill>
+        </p:grpSpPr>
+        <p:sp>
+          <p:nvSpPr>
+            <p:cNvPr id="5" name="Cloud 4"/>
+            <p:cNvSpPr/>
+            <p:nvPr/>
+          </p:nvSpPr>
+          <p:spPr>
+            <a:xfrm>
+              <a:off x="6993290" y="4916775"/>
+              <a:ext cx="2638269" cy="2038662"/>
+            </a:xfrm>
+            <a:prstGeom prst="cloud">
+              <a:avLst/>
+            </a:prstGeom>
+            <a:grpFill/>
+          </p:spPr>
+          <p:style>
+            <a:lnRef idx="2">
+              <a:schemeClr val="accent1">
+                <a:shade val="50000"/>
+              </a:schemeClr>
+            </a:lnRef>
+            <a:fillRef idx="1">
+              <a:schemeClr val="accent1"/>
+            </a:fillRef>
+            <a:effectRef idx="0">
+              <a:schemeClr val="accent1"/>
+            </a:effectRef>
+            <a:fontRef idx="minor">
+              <a:schemeClr val="lt1"/>
+            </a:fontRef>
+          </p:style>
+          <p:txBody>
+            <a:bodyPr rtlCol="0" anchor="ctr"/>
+            <a:lstStyle/>
+            <a:p>
+              <a:pPr algn="ctr"/>
+              <a:endParaRPr lang="en-US"/>
+            </a:p>
+          </p:txBody>
+        </p:sp>
+        <p:pic>
+          <p:nvPicPr>
+            <p:cNvPr id="13" name="Picture 12"/>
+            <p:cNvPicPr>
+              <a:picLocks noChangeAspect="1"/>
+            </p:cNvPicPr>
+            <p:nvPr/>
+          </p:nvPicPr>
+          <p:blipFill>
+            <a:blip r:embed="rId5"/>
+            <a:stretch>
+              <a:fillRect/>
+            </a:stretch>
+          </p:blipFill>
+          <p:spPr>
+            <a:xfrm>
+              <a:off x="7066289" y="5628445"/>
+              <a:ext cx="2565270" cy="583886"/>
+            </a:xfrm>
+            <a:prstGeom prst="rect">
+              <a:avLst/>
+            </a:prstGeom>
+            <a:grpFill/>
+          </p:spPr>
+        </p:pic>
+      </p:grpSp>
+    </p:spTree>
+    <p:extLst>
+      <p:ext uri="{BB962C8B-B14F-4D97-AF65-F5344CB8AC3E}">
+        <p14:creationId xmlns:p14="http://schemas.microsoft.com/office/powerpoint/2010/main" val="2218060397"/>
+      </p:ext>
+    </p:extLst>
+  </p:cSld>
+  <p:clrMapOvr>
+    <a:masterClrMapping/>
+  </p:clrMapOvr>
+  <mc:AlternateContent xmlns:mc="http://schemas.openxmlformats.org/markup-compatibility/2006">
+    <mc:Choice xmlns:p14="http://schemas.microsoft.com/office/powerpoint/2010/main" Requires="p14">
+      <p:transition spd="med" p14:dur="700">
+        <p:fade/>
+      </p:transition>
+    </mc:Choice>
+    <mc:Fallback>
+      <p:transition spd="med">
+        <p:fade/>
+      </p:transition>
+    </mc:Fallback>
+  </mc:AlternateContent>
+  <p:timing>
+    <p:tnLst>
+      <p:par>
+        <p:cTn id="1" dur="indefinite" restart="never" nodeType="tmRoot"/>
+      </p:par>
+    </p:tnLst>
+  </p:timing>
+</p:sld>
+</file>
+
+<file path=ppt/slides/slide13.xml><?xml version="1.0" encoding="utf-8"?>
+<p:sld xmlns:a="http://schemas.openxmlformats.org/drawingml/2006/main" xmlns:r="http://schemas.openxmlformats.org/officeDocument/2006/relationships" xmlns:p="http://schemas.openxmlformats.org/presentationml/2006/main">
+  <p:cSld>
+    <p:spTree>
+      <p:nvGrpSpPr>
+        <p:cNvPr id="1" name=""/>
+        <p:cNvGrpSpPr/>
+        <p:nvPr/>
+      </p:nvGrpSpPr>
+      <p:grpSpPr>
+        <a:xfrm>
+          <a:off x="0" y="0"/>
+          <a:ext cx="0" cy="0"/>
+          <a:chOff x="0" y="0"/>
+          <a:chExt cx="0" cy="0"/>
+        </a:xfrm>
+      </p:grpSpPr>
+      <p:sp>
+        <p:nvSpPr>
+          <p:cNvPr id="2" name="Title 1"/>
+          <p:cNvSpPr>
+            <a:spLocks noGrp="1"/>
+          </p:cNvSpPr>
+          <p:nvPr>
+            <p:ph type="title"/>
+          </p:nvPr>
+        </p:nvSpPr>
+        <p:spPr/>
+        <p:txBody>
+          <a:bodyPr/>
+          <a:lstStyle/>
+          <a:p>
+            <a:r>
+              <a:rPr lang="en-US" dirty="0" smtClean="0"/>
+              <a:t>Point: The Clouds are one big machine</a:t>
+            </a:r>
+            <a:endParaRPr lang="en-US" dirty="0"/>
+          </a:p>
+        </p:txBody>
+      </p:sp>
+      <p:grpSp>
+        <p:nvGrpSpPr>
+          <p:cNvPr id="11" name="Group 10"/>
+          <p:cNvGrpSpPr/>
+          <p:nvPr/>
+        </p:nvGrpSpPr>
+        <p:grpSpPr>
+          <a:xfrm>
+            <a:off x="308862" y="4916775"/>
+            <a:ext cx="2638269" cy="2038662"/>
+            <a:chOff x="1154242" y="2698230"/>
+            <a:chExt cx="2638269" cy="2038662"/>
+          </a:xfrm>
+          <a:solidFill>
+            <a:schemeClr val="tx1"/>
+          </a:solidFill>
+        </p:grpSpPr>
+        <p:sp>
+          <p:nvSpPr>
+            <p:cNvPr id="6" name="Cloud 5"/>
+            <p:cNvSpPr/>
+            <p:nvPr/>
+          </p:nvSpPr>
+          <p:spPr>
+            <a:xfrm>
+              <a:off x="1154242" y="2698230"/>
+              <a:ext cx="2638269" cy="2038662"/>
+            </a:xfrm>
+            <a:prstGeom prst="cloud">
+              <a:avLst/>
+            </a:prstGeom>
+            <a:grpFill/>
+          </p:spPr>
+          <p:style>
+            <a:lnRef idx="2">
+              <a:schemeClr val="accent1">
+                <a:shade val="50000"/>
+              </a:schemeClr>
+            </a:lnRef>
+            <a:fillRef idx="1">
+              <a:schemeClr val="accent1"/>
+            </a:fillRef>
+            <a:effectRef idx="0">
+              <a:schemeClr val="accent1"/>
+            </a:effectRef>
+            <a:fontRef idx="minor">
+              <a:schemeClr val="lt1"/>
+            </a:fontRef>
+          </p:style>
+          <p:txBody>
+            <a:bodyPr rtlCol="0" anchor="ctr"/>
+            <a:lstStyle/>
+            <a:p>
+              <a:pPr algn="ctr"/>
+              <a:endParaRPr lang="en-US"/>
+            </a:p>
+          </p:txBody>
+        </p:sp>
+        <p:pic>
+          <p:nvPicPr>
+            <p:cNvPr id="7" name="Picture 6"/>
+            <p:cNvPicPr>
+              <a:picLocks noChangeAspect="1"/>
+            </p:cNvPicPr>
+            <p:nvPr/>
+          </p:nvPicPr>
+          <p:blipFill>
+            <a:blip r:embed="rId2"/>
+            <a:stretch>
+              <a:fillRect/>
+            </a:stretch>
+          </p:blipFill>
+          <p:spPr>
+            <a:xfrm>
+              <a:off x="1770757" y="3441336"/>
+              <a:ext cx="1333500" cy="552450"/>
+            </a:xfrm>
+            <a:prstGeom prst="rect">
+              <a:avLst/>
+            </a:prstGeom>
+            <a:grpFill/>
+          </p:spPr>
+        </p:pic>
+      </p:grpSp>
+      <p:grpSp>
+        <p:nvGrpSpPr>
+          <p:cNvPr id="12" name="Group 11"/>
+          <p:cNvGrpSpPr/>
+          <p:nvPr/>
+        </p:nvGrpSpPr>
+        <p:grpSpPr>
+          <a:xfrm>
+            <a:off x="7010778" y="2042863"/>
+            <a:ext cx="2638269" cy="2038662"/>
+            <a:chOff x="6103495" y="1801319"/>
+            <a:chExt cx="2638269" cy="2038662"/>
+          </a:xfrm>
+          <a:solidFill>
+            <a:schemeClr val="tx1"/>
+          </a:solidFill>
+        </p:grpSpPr>
+        <p:sp>
+          <p:nvSpPr>
+            <p:cNvPr id="4" name="Cloud 3"/>
+            <p:cNvSpPr/>
+            <p:nvPr/>
+          </p:nvSpPr>
+          <p:spPr>
+            <a:xfrm>
+              <a:off x="6103495" y="1801319"/>
+              <a:ext cx="2638269" cy="2038662"/>
+            </a:xfrm>
+            <a:prstGeom prst="cloud">
+              <a:avLst/>
+            </a:prstGeom>
+            <a:grpFill/>
+          </p:spPr>
+          <p:style>
+            <a:lnRef idx="2">
+              <a:schemeClr val="accent1">
+                <a:shade val="50000"/>
+              </a:schemeClr>
+            </a:lnRef>
+            <a:fillRef idx="1">
+              <a:schemeClr val="accent1"/>
+            </a:fillRef>
+            <a:effectRef idx="0">
+              <a:schemeClr val="accent1"/>
+            </a:effectRef>
+            <a:fontRef idx="minor">
+              <a:schemeClr val="lt1"/>
+            </a:fontRef>
+          </p:style>
+          <p:txBody>
+            <a:bodyPr rtlCol="0" anchor="ctr"/>
+            <a:lstStyle/>
+            <a:p>
+              <a:pPr algn="ctr"/>
+              <a:endParaRPr lang="en-US"/>
+            </a:p>
+          </p:txBody>
+        </p:sp>
+        <p:pic>
+          <p:nvPicPr>
+            <p:cNvPr id="8" name="Picture 7"/>
+            <p:cNvPicPr>
+              <a:picLocks noChangeAspect="1"/>
+            </p:cNvPicPr>
+            <p:nvPr/>
+          </p:nvPicPr>
+          <p:blipFill>
+            <a:blip r:embed="rId3"/>
+            <a:stretch>
+              <a:fillRect/>
+            </a:stretch>
+          </p:blipFill>
+          <p:spPr>
+            <a:xfrm>
+              <a:off x="6435999" y="2443850"/>
+              <a:ext cx="1876425" cy="609600"/>
+            </a:xfrm>
+            <a:prstGeom prst="rect">
+              <a:avLst/>
+            </a:prstGeom>
+            <a:grpFill/>
+          </p:spPr>
+        </p:pic>
+      </p:grpSp>
+      <p:grpSp>
+        <p:nvGrpSpPr>
+          <p:cNvPr id="10" name="Group 9"/>
+          <p:cNvGrpSpPr/>
+          <p:nvPr/>
+        </p:nvGrpSpPr>
+        <p:grpSpPr>
+          <a:xfrm>
+            <a:off x="3563646" y="4916775"/>
+            <a:ext cx="2638269" cy="2038662"/>
+            <a:chOff x="3104255" y="4916775"/>
+            <a:chExt cx="2638269" cy="2038662"/>
+          </a:xfrm>
+          <a:solidFill>
+            <a:schemeClr val="tx1"/>
+          </a:solidFill>
+        </p:grpSpPr>
+        <p:sp>
+          <p:nvSpPr>
+            <p:cNvPr id="3" name="Cloud 2"/>
+            <p:cNvSpPr/>
+            <p:nvPr/>
+          </p:nvSpPr>
+          <p:spPr>
+            <a:xfrm>
+              <a:off x="3104255" y="4916775"/>
+              <a:ext cx="2638269" cy="2038662"/>
+            </a:xfrm>
+            <a:prstGeom prst="cloud">
+              <a:avLst/>
+            </a:prstGeom>
+            <a:grpFill/>
+          </p:spPr>
+          <p:style>
+            <a:lnRef idx="2">
+              <a:schemeClr val="accent1">
+                <a:shade val="50000"/>
+              </a:schemeClr>
+            </a:lnRef>
+            <a:fillRef idx="1">
+              <a:schemeClr val="accent1"/>
+            </a:fillRef>
+            <a:effectRef idx="0">
+              <a:schemeClr val="accent1"/>
+            </a:effectRef>
+            <a:fontRef idx="minor">
+              <a:schemeClr val="lt1"/>
+            </a:fontRef>
+          </p:style>
+          <p:txBody>
+            <a:bodyPr rtlCol="0" anchor="ctr"/>
+            <a:lstStyle/>
+            <a:p>
+              <a:pPr algn="ctr"/>
+              <a:endParaRPr lang="en-US"/>
+            </a:p>
+          </p:txBody>
+        </p:sp>
+        <p:pic>
+          <p:nvPicPr>
+            <p:cNvPr id="9" name="Picture 8"/>
+            <p:cNvPicPr>
+              <a:picLocks noChangeAspect="1"/>
+            </p:cNvPicPr>
+            <p:nvPr/>
+          </p:nvPicPr>
+          <p:blipFill>
+            <a:blip r:embed="rId4"/>
+            <a:stretch>
+              <a:fillRect/>
+            </a:stretch>
+          </p:blipFill>
+          <p:spPr>
+            <a:xfrm>
+              <a:off x="3418503" y="5530434"/>
+              <a:ext cx="2009775" cy="590550"/>
+            </a:xfrm>
+            <a:prstGeom prst="rect">
+              <a:avLst/>
+            </a:prstGeom>
+            <a:grpFill/>
+          </p:spPr>
+        </p:pic>
+      </p:grpSp>
+      <p:grpSp>
+        <p:nvGrpSpPr>
+          <p:cNvPr id="14" name="Group 13"/>
+          <p:cNvGrpSpPr/>
+          <p:nvPr/>
+        </p:nvGrpSpPr>
+        <p:grpSpPr>
+          <a:xfrm>
+            <a:off x="6993290" y="4916775"/>
+            <a:ext cx="2638269" cy="2038662"/>
+            <a:chOff x="6993290" y="4916775"/>
+            <a:chExt cx="2638269" cy="2038662"/>
+          </a:xfrm>
+          <a:solidFill>
+            <a:schemeClr val="tx1"/>
+          </a:solidFill>
+        </p:grpSpPr>
+        <p:sp>
+          <p:nvSpPr>
+            <p:cNvPr id="5" name="Cloud 4"/>
+            <p:cNvSpPr/>
+            <p:nvPr/>
+          </p:nvSpPr>
+          <p:spPr>
+            <a:xfrm>
+              <a:off x="6993290" y="4916775"/>
+              <a:ext cx="2638269" cy="2038662"/>
+            </a:xfrm>
+            <a:prstGeom prst="cloud">
+              <a:avLst/>
+            </a:prstGeom>
+            <a:grpFill/>
+          </p:spPr>
+          <p:style>
+            <a:lnRef idx="2">
+              <a:schemeClr val="accent1">
+                <a:shade val="50000"/>
+              </a:schemeClr>
+            </a:lnRef>
+            <a:fillRef idx="1">
+              <a:schemeClr val="accent1"/>
+            </a:fillRef>
+            <a:effectRef idx="0">
+              <a:schemeClr val="accent1"/>
+            </a:effectRef>
+            <a:fontRef idx="minor">
+              <a:schemeClr val="lt1"/>
+            </a:fontRef>
+          </p:style>
+          <p:txBody>
+            <a:bodyPr rtlCol="0" anchor="ctr"/>
+            <a:lstStyle/>
+            <a:p>
+              <a:pPr algn="ctr"/>
+              <a:endParaRPr lang="en-US"/>
+            </a:p>
+          </p:txBody>
+        </p:sp>
+        <p:pic>
+          <p:nvPicPr>
+            <p:cNvPr id="13" name="Picture 12"/>
+            <p:cNvPicPr>
+              <a:picLocks noChangeAspect="1"/>
+            </p:cNvPicPr>
+            <p:nvPr/>
+          </p:nvPicPr>
+          <p:blipFill>
+            <a:blip r:embed="rId5"/>
+            <a:stretch>
+              <a:fillRect/>
+            </a:stretch>
+          </p:blipFill>
+          <p:spPr>
+            <a:xfrm>
+              <a:off x="7066289" y="5628445"/>
+              <a:ext cx="2565270" cy="583886"/>
+            </a:xfrm>
+            <a:prstGeom prst="rect">
+              <a:avLst/>
+            </a:prstGeom>
+            <a:grpFill/>
+          </p:spPr>
+        </p:pic>
+      </p:grpSp>
+      <p:pic>
+        <p:nvPicPr>
+          <p:cNvPr id="16" name="Picture 15"/>
+          <p:cNvPicPr>
+            <a:picLocks noChangeAspect="1"/>
+          </p:cNvPicPr>
+          <p:nvPr/>
+        </p:nvPicPr>
+        <p:blipFill>
+          <a:blip r:embed="rId6">
+            <a:extLst>
+              <a:ext uri="{28A0092B-C50C-407E-A947-70E740481C1C}">
+                <a14:useLocalDpi xmlns:a14="http://schemas.microsoft.com/office/drawing/2010/main" val="0"/>
+              </a:ext>
+            </a:extLst>
+          </a:blip>
+          <a:stretch>
+            <a:fillRect/>
+          </a:stretch>
+        </p:blipFill>
+        <p:spPr>
+          <a:xfrm>
+            <a:off x="714258" y="1864443"/>
+            <a:ext cx="1755738" cy="1755738"/>
+          </a:xfrm>
+          <a:prstGeom prst="rect">
+            <a:avLst/>
+          </a:prstGeom>
+        </p:spPr>
+      </p:pic>
+      <p:sp>
+        <p:nvSpPr>
+          <p:cNvPr id="17" name="Rounded Rectangle 16"/>
+          <p:cNvSpPr/>
+          <p:nvPr/>
+        </p:nvSpPr>
+        <p:spPr>
+          <a:xfrm>
+            <a:off x="2947131" y="2990194"/>
+            <a:ext cx="2727025" cy="982199"/>
+          </a:xfrm>
+          <a:prstGeom prst="roundRect">
+            <a:avLst/>
+          </a:prstGeom>
+        </p:spPr>
+        <p:style>
+          <a:lnRef idx="2">
+            <a:schemeClr val="accent1">
+              <a:shade val="50000"/>
+            </a:schemeClr>
+          </a:lnRef>
+          <a:fillRef idx="1">
+            <a:schemeClr val="accent1"/>
+          </a:fillRef>
+          <a:effectRef idx="0">
+            <a:schemeClr val="accent1"/>
+          </a:effectRef>
+          <a:fontRef idx="minor">
+            <a:schemeClr val="lt1"/>
+          </a:fontRef>
+        </p:style>
+        <p:txBody>
+          <a:bodyPr rtlCol="0" anchor="ctr"/>
+          <a:lstStyle/>
+          <a:p>
+            <a:pPr algn="ctr"/>
+            <a:r>
+              <a:rPr lang="en-US" dirty="0" smtClean="0"/>
+              <a:t>Docker Client</a:t>
+            </a:r>
+            <a:endParaRPr lang="en-US" dirty="0"/>
+          </a:p>
+        </p:txBody>
+      </p:sp>
+      <p:cxnSp>
+        <p:nvCxnSpPr>
+          <p:cNvPr id="19" name="Straight Arrow Connector 18"/>
+          <p:cNvCxnSpPr>
+            <a:stCxn id="17" idx="3"/>
+          </p:cNvCxnSpPr>
+          <p:nvPr/>
+        </p:nvCxnSpPr>
+        <p:spPr>
+          <a:xfrm>
+            <a:off x="5674156" y="3481294"/>
+            <a:ext cx="1392133" cy="26404"/>
+          </a:xfrm>
+          <a:prstGeom prst="straightConnector1">
+            <a:avLst/>
+          </a:prstGeom>
+          <a:ln>
+            <a:tailEnd type="triangle"/>
+          </a:ln>
+        </p:spPr>
+        <p:style>
+          <a:lnRef idx="3">
+            <a:schemeClr val="accent1"/>
+          </a:lnRef>
+          <a:fillRef idx="0">
+            <a:schemeClr val="accent1"/>
+          </a:fillRef>
+          <a:effectRef idx="2">
+            <a:schemeClr val="accent1"/>
+          </a:effectRef>
+          <a:fontRef idx="minor">
+            <a:schemeClr val="tx1"/>
+          </a:fontRef>
+        </p:style>
+      </p:cxnSp>
+      <p:cxnSp>
+        <p:nvCxnSpPr>
+          <p:cNvPr id="21" name="Straight Arrow Connector 20"/>
+          <p:cNvCxnSpPr>
+            <a:stCxn id="17" idx="3"/>
+          </p:cNvCxnSpPr>
+          <p:nvPr/>
+        </p:nvCxnSpPr>
+        <p:spPr>
+          <a:xfrm>
+            <a:off x="5674156" y="3481294"/>
+            <a:ext cx="1775955" cy="1680103"/>
+          </a:xfrm>
+          <a:prstGeom prst="straightConnector1">
+            <a:avLst/>
+          </a:prstGeom>
+          <a:ln>
+            <a:tailEnd type="triangle"/>
+          </a:ln>
+        </p:spPr>
+        <p:style>
+          <a:lnRef idx="3">
+            <a:schemeClr val="accent1"/>
+          </a:lnRef>
+          <a:fillRef idx="0">
+            <a:schemeClr val="accent1"/>
+          </a:fillRef>
+          <a:effectRef idx="2">
+            <a:schemeClr val="accent1"/>
+          </a:effectRef>
+          <a:fontRef idx="minor">
+            <a:schemeClr val="tx1"/>
+          </a:fontRef>
+        </p:style>
+      </p:cxnSp>
+      <p:cxnSp>
+        <p:nvCxnSpPr>
+          <p:cNvPr id="23" name="Straight Arrow Connector 22"/>
+          <p:cNvCxnSpPr>
+            <a:stCxn id="17" idx="2"/>
+            <a:endCxn id="3" idx="3"/>
+          </p:cNvCxnSpPr>
+          <p:nvPr/>
+        </p:nvCxnSpPr>
+        <p:spPr>
+          <a:xfrm>
+            <a:off x="4310644" y="3972393"/>
+            <a:ext cx="572137" cy="1060944"/>
+          </a:xfrm>
+          <a:prstGeom prst="straightConnector1">
+            <a:avLst/>
+          </a:prstGeom>
+          <a:ln>
+            <a:tailEnd type="triangle"/>
+          </a:ln>
+        </p:spPr>
+        <p:style>
+          <a:lnRef idx="3">
+            <a:schemeClr val="accent1"/>
+          </a:lnRef>
+          <a:fillRef idx="0">
+            <a:schemeClr val="accent1"/>
+          </a:fillRef>
+          <a:effectRef idx="2">
+            <a:schemeClr val="accent1"/>
+          </a:effectRef>
+          <a:fontRef idx="minor">
+            <a:schemeClr val="tx1"/>
+          </a:fontRef>
+        </p:style>
+      </p:cxnSp>
+      <p:cxnSp>
+        <p:nvCxnSpPr>
+          <p:cNvPr id="25" name="Straight Arrow Connector 24"/>
+          <p:cNvCxnSpPr>
+            <a:stCxn id="17" idx="2"/>
+            <a:endCxn id="6" idx="3"/>
+          </p:cNvCxnSpPr>
+          <p:nvPr/>
+        </p:nvCxnSpPr>
+        <p:spPr>
+          <a:xfrm flipH="1">
+            <a:off x="1627997" y="3972393"/>
+            <a:ext cx="2682647" cy="1060944"/>
+          </a:xfrm>
+          <a:prstGeom prst="straightConnector1">
+            <a:avLst/>
+          </a:prstGeom>
+          <a:ln>
+            <a:tailEnd type="triangle"/>
+          </a:ln>
+        </p:spPr>
+        <p:style>
+          <a:lnRef idx="3">
+            <a:schemeClr val="accent1"/>
+          </a:lnRef>
+          <a:fillRef idx="0">
+            <a:schemeClr val="accent1"/>
+          </a:fillRef>
+          <a:effectRef idx="2">
+            <a:schemeClr val="accent1"/>
+          </a:effectRef>
+          <a:fontRef idx="minor">
+            <a:schemeClr val="tx1"/>
+          </a:fontRef>
+        </p:style>
+      </p:cxnSp>
+      <p:cxnSp>
+        <p:nvCxnSpPr>
+          <p:cNvPr id="27" name="Straight Arrow Connector 26"/>
+          <p:cNvCxnSpPr>
+            <a:stCxn id="16" idx="3"/>
+          </p:cNvCxnSpPr>
+          <p:nvPr/>
+        </p:nvCxnSpPr>
+        <p:spPr>
+          <a:xfrm>
+            <a:off x="2469996" y="2742312"/>
+            <a:ext cx="477135" cy="247882"/>
+          </a:xfrm>
+          <a:prstGeom prst="straightConnector1">
+            <a:avLst/>
+          </a:prstGeom>
+          <a:ln>
+            <a:tailEnd type="triangle"/>
+          </a:ln>
+        </p:spPr>
+        <p:style>
+          <a:lnRef idx="3">
+            <a:schemeClr val="accent1"/>
+          </a:lnRef>
+          <a:fillRef idx="0">
+            <a:schemeClr val="accent1"/>
+          </a:fillRef>
+          <a:effectRef idx="2">
+            <a:schemeClr val="accent1"/>
+          </a:effectRef>
+          <a:fontRef idx="minor">
+            <a:schemeClr val="tx1"/>
+          </a:fontRef>
+        </p:style>
+      </p:cxnSp>
+    </p:spTree>
+    <p:extLst>
+      <p:ext uri="{BB962C8B-B14F-4D97-AF65-F5344CB8AC3E}">
+        <p14:creationId xmlns:p14="http://schemas.microsoft.com/office/powerpoint/2010/main" val="4177043815"/>
+      </p:ext>
+    </p:extLst>
+  </p:cSld>
+  <p:clrMapOvr>
+    <a:masterClrMapping/>
+  </p:clrMapOvr>
+  <mc:AlternateContent xmlns:mc="http://schemas.openxmlformats.org/markup-compatibility/2006">
+    <mc:Choice xmlns:p14="http://schemas.microsoft.com/office/powerpoint/2010/main" Requires="p14">
+      <p:transition spd="med" p14:dur="700">
+        <p:fade/>
+      </p:transition>
+    </mc:Choice>
+    <mc:Fallback>
+      <p:transition spd="med">
+        <p:fade/>
+      </p:transition>
+    </mc:Fallback>
+  </mc:AlternateContent>
+  <p:timing>
+    <p:tnLst>
+      <p:par>
+        <p:cTn id="1" dur="indefinite" restart="never" nodeType="tmRoot"/>
+      </p:par>
+    </p:tnLst>
+  </p:timing>
+</p:sld>
+</file>
+
+<file path=ppt/slides/slide14.xml><?xml version="1.0" encoding="utf-8"?>
+<p:sld xmlns:a="http://schemas.openxmlformats.org/drawingml/2006/main" xmlns:r="http://schemas.openxmlformats.org/officeDocument/2006/relationships" xmlns:p="http://schemas.openxmlformats.org/presentationml/2006/main">
+  <p:cSld>
+    <p:spTree>
+      <p:nvGrpSpPr>
+        <p:cNvPr id="1" name=""/>
+        <p:cNvGrpSpPr/>
+        <p:nvPr/>
+      </p:nvGrpSpPr>
+      <p:grpSpPr>
+        <a:xfrm>
+          <a:off x="0" y="0"/>
+          <a:ext cx="0" cy="0"/>
+          <a:chOff x="0" y="0"/>
+          <a:chExt cx="0" cy="0"/>
+        </a:xfrm>
+      </p:grpSpPr>
+      <p:sp>
+        <p:nvSpPr>
+          <p:cNvPr id="2" name="Title 1"/>
+          <p:cNvSpPr>
+            <a:spLocks noGrp="1"/>
+          </p:cNvSpPr>
+          <p:nvPr>
+            <p:ph type="title"/>
+          </p:nvPr>
+        </p:nvSpPr>
+        <p:spPr/>
+        <p:txBody>
+          <a:bodyPr/>
+          <a:lstStyle/>
+          <a:p>
+            <a:r>
+              <a:rPr lang="en-US" dirty="0" smtClean="0"/>
+              <a:t>Point: The Clouds are one big machine</a:t>
+            </a:r>
+            <a:endParaRPr lang="en-US" dirty="0"/>
+          </a:p>
+        </p:txBody>
+      </p:sp>
+      <p:grpSp>
+        <p:nvGrpSpPr>
+          <p:cNvPr id="11" name="Group 10"/>
+          <p:cNvGrpSpPr/>
+          <p:nvPr/>
+        </p:nvGrpSpPr>
+        <p:grpSpPr>
+          <a:xfrm>
+            <a:off x="5348122" y="5888853"/>
+            <a:ext cx="1710499" cy="1334124"/>
+            <a:chOff x="1154242" y="2698230"/>
+            <a:chExt cx="2638269" cy="2038662"/>
+          </a:xfrm>
+          <a:solidFill>
+            <a:schemeClr val="tx1"/>
+          </a:solidFill>
+        </p:grpSpPr>
+        <p:sp>
+          <p:nvSpPr>
+            <p:cNvPr id="6" name="Cloud 5"/>
+            <p:cNvSpPr/>
+            <p:nvPr/>
+          </p:nvSpPr>
+          <p:spPr>
+            <a:xfrm>
+              <a:off x="1154242" y="2698230"/>
+              <a:ext cx="2638269" cy="2038662"/>
+            </a:xfrm>
+            <a:prstGeom prst="cloud">
+              <a:avLst/>
+            </a:prstGeom>
+            <a:grpFill/>
+          </p:spPr>
+          <p:style>
+            <a:lnRef idx="2">
+              <a:schemeClr val="accent1">
+                <a:shade val="50000"/>
+              </a:schemeClr>
+            </a:lnRef>
+            <a:fillRef idx="1">
+              <a:schemeClr val="accent1"/>
+            </a:fillRef>
+            <a:effectRef idx="0">
+              <a:schemeClr val="accent1"/>
+            </a:effectRef>
+            <a:fontRef idx="minor">
+              <a:schemeClr val="lt1"/>
+            </a:fontRef>
+          </p:style>
+          <p:txBody>
+            <a:bodyPr rtlCol="0" anchor="ctr"/>
+            <a:lstStyle/>
+            <a:p>
+              <a:pPr algn="ctr"/>
+              <a:endParaRPr lang="en-US"/>
+            </a:p>
+          </p:txBody>
+        </p:sp>
+        <p:pic>
+          <p:nvPicPr>
+            <p:cNvPr id="7" name="Picture 6"/>
+            <p:cNvPicPr>
+              <a:picLocks noChangeAspect="1"/>
+            </p:cNvPicPr>
+            <p:nvPr/>
+          </p:nvPicPr>
+          <p:blipFill>
+            <a:blip r:embed="rId2"/>
+            <a:stretch>
+              <a:fillRect/>
+            </a:stretch>
+          </p:blipFill>
+          <p:spPr>
+            <a:xfrm>
+              <a:off x="1770757" y="3441336"/>
+              <a:ext cx="1333500" cy="552450"/>
+            </a:xfrm>
+            <a:prstGeom prst="rect">
+              <a:avLst/>
+            </a:prstGeom>
+            <a:grpFill/>
+          </p:spPr>
+        </p:pic>
+      </p:grpSp>
+      <p:grpSp>
+        <p:nvGrpSpPr>
+          <p:cNvPr id="12" name="Group 11"/>
+          <p:cNvGrpSpPr/>
+          <p:nvPr/>
+        </p:nvGrpSpPr>
+        <p:grpSpPr>
+          <a:xfrm>
+            <a:off x="5419783" y="1418225"/>
+            <a:ext cx="1301647" cy="1069394"/>
+            <a:chOff x="6103495" y="1801319"/>
+            <a:chExt cx="2638269" cy="2038662"/>
+          </a:xfrm>
+          <a:solidFill>
+            <a:schemeClr val="tx1"/>
+          </a:solidFill>
+        </p:grpSpPr>
+        <p:sp>
+          <p:nvSpPr>
+            <p:cNvPr id="4" name="Cloud 3"/>
+            <p:cNvSpPr/>
+            <p:nvPr/>
+          </p:nvSpPr>
+          <p:spPr>
+            <a:xfrm>
+              <a:off x="6103495" y="1801319"/>
+              <a:ext cx="2638269" cy="2038662"/>
+            </a:xfrm>
+            <a:prstGeom prst="cloud">
+              <a:avLst/>
+            </a:prstGeom>
+            <a:grpFill/>
+          </p:spPr>
+          <p:style>
+            <a:lnRef idx="2">
+              <a:schemeClr val="accent1">
+                <a:shade val="50000"/>
+              </a:schemeClr>
+            </a:lnRef>
+            <a:fillRef idx="1">
+              <a:schemeClr val="accent1"/>
+            </a:fillRef>
+            <a:effectRef idx="0">
+              <a:schemeClr val="accent1"/>
+            </a:effectRef>
+            <a:fontRef idx="minor">
+              <a:schemeClr val="lt1"/>
+            </a:fontRef>
+          </p:style>
+          <p:txBody>
+            <a:bodyPr rtlCol="0" anchor="ctr"/>
+            <a:lstStyle/>
+            <a:p>
+              <a:pPr algn="ctr"/>
+              <a:endParaRPr lang="en-US"/>
+            </a:p>
+          </p:txBody>
+        </p:sp>
+        <p:pic>
+          <p:nvPicPr>
+            <p:cNvPr id="8" name="Picture 7"/>
+            <p:cNvPicPr>
+              <a:picLocks noChangeAspect="1"/>
+            </p:cNvPicPr>
+            <p:nvPr/>
+          </p:nvPicPr>
+          <p:blipFill>
+            <a:blip r:embed="rId3"/>
+            <a:stretch>
+              <a:fillRect/>
+            </a:stretch>
+          </p:blipFill>
+          <p:spPr>
+            <a:xfrm>
+              <a:off x="6435999" y="2443850"/>
+              <a:ext cx="1876425" cy="609600"/>
+            </a:xfrm>
+            <a:prstGeom prst="rect">
+              <a:avLst/>
+            </a:prstGeom>
+            <a:grpFill/>
+          </p:spPr>
+        </p:pic>
+      </p:grpSp>
+      <p:grpSp>
+        <p:nvGrpSpPr>
+          <p:cNvPr id="10" name="Group 9"/>
+          <p:cNvGrpSpPr/>
+          <p:nvPr/>
+        </p:nvGrpSpPr>
+        <p:grpSpPr>
+          <a:xfrm>
+            <a:off x="5306575" y="4342754"/>
+            <a:ext cx="1522138" cy="1191106"/>
+            <a:chOff x="3104255" y="4916775"/>
+            <a:chExt cx="2638269" cy="2038662"/>
+          </a:xfrm>
+          <a:solidFill>
+            <a:schemeClr val="tx1"/>
+          </a:solidFill>
+        </p:grpSpPr>
+        <p:sp>
+          <p:nvSpPr>
+            <p:cNvPr id="3" name="Cloud 2"/>
+            <p:cNvSpPr/>
+            <p:nvPr/>
+          </p:nvSpPr>
+          <p:spPr>
+            <a:xfrm>
+              <a:off x="3104255" y="4916775"/>
+              <a:ext cx="2638269" cy="2038662"/>
+            </a:xfrm>
+            <a:prstGeom prst="cloud">
+              <a:avLst/>
+            </a:prstGeom>
+            <a:grpFill/>
+          </p:spPr>
+          <p:style>
+            <a:lnRef idx="2">
+              <a:schemeClr val="accent1">
+                <a:shade val="50000"/>
+              </a:schemeClr>
+            </a:lnRef>
+            <a:fillRef idx="1">
+              <a:schemeClr val="accent1"/>
+            </a:fillRef>
+            <a:effectRef idx="0">
+              <a:schemeClr val="accent1"/>
+            </a:effectRef>
+            <a:fontRef idx="minor">
+              <a:schemeClr val="lt1"/>
+            </a:fontRef>
+          </p:style>
+          <p:txBody>
+            <a:bodyPr rtlCol="0" anchor="ctr"/>
+            <a:lstStyle/>
+            <a:p>
+              <a:pPr algn="ctr"/>
+              <a:endParaRPr lang="en-US"/>
+            </a:p>
+          </p:txBody>
+        </p:sp>
+        <p:pic>
+          <p:nvPicPr>
+            <p:cNvPr id="9" name="Picture 8"/>
+            <p:cNvPicPr>
+              <a:picLocks noChangeAspect="1"/>
+            </p:cNvPicPr>
+            <p:nvPr/>
+          </p:nvPicPr>
+          <p:blipFill>
+            <a:blip r:embed="rId4"/>
+            <a:stretch>
+              <a:fillRect/>
+            </a:stretch>
+          </p:blipFill>
+          <p:spPr>
+            <a:xfrm>
+              <a:off x="3418503" y="5530434"/>
+              <a:ext cx="2009775" cy="590550"/>
+            </a:xfrm>
+            <a:prstGeom prst="rect">
+              <a:avLst/>
+            </a:prstGeom>
+            <a:grpFill/>
+          </p:spPr>
+        </p:pic>
+      </p:grpSp>
+      <p:grpSp>
+        <p:nvGrpSpPr>
+          <p:cNvPr id="14" name="Group 13"/>
+          <p:cNvGrpSpPr/>
+          <p:nvPr/>
+        </p:nvGrpSpPr>
+        <p:grpSpPr>
+          <a:xfrm>
+            <a:off x="5306575" y="2821349"/>
+            <a:ext cx="1501560" cy="1166412"/>
+            <a:chOff x="6993290" y="4916775"/>
+            <a:chExt cx="2638269" cy="2038662"/>
+          </a:xfrm>
+          <a:solidFill>
+            <a:schemeClr val="tx1"/>
+          </a:solidFill>
+        </p:grpSpPr>
+        <p:sp>
+          <p:nvSpPr>
+            <p:cNvPr id="5" name="Cloud 4"/>
+            <p:cNvSpPr/>
+            <p:nvPr/>
+          </p:nvSpPr>
+          <p:spPr>
+            <a:xfrm>
+              <a:off x="6993290" y="4916775"/>
+              <a:ext cx="2638269" cy="2038662"/>
+            </a:xfrm>
+            <a:prstGeom prst="cloud">
+              <a:avLst/>
+            </a:prstGeom>
+            <a:grpFill/>
+          </p:spPr>
+          <p:style>
+            <a:lnRef idx="2">
+              <a:schemeClr val="accent1">
+                <a:shade val="50000"/>
+              </a:schemeClr>
+            </a:lnRef>
+            <a:fillRef idx="1">
+              <a:schemeClr val="accent1"/>
+            </a:fillRef>
+            <a:effectRef idx="0">
+              <a:schemeClr val="accent1"/>
+            </a:effectRef>
+            <a:fontRef idx="minor">
+              <a:schemeClr val="lt1"/>
+            </a:fontRef>
+          </p:style>
+          <p:txBody>
+            <a:bodyPr rtlCol="0" anchor="ctr"/>
+            <a:lstStyle/>
+            <a:p>
+              <a:pPr algn="ctr"/>
+              <a:endParaRPr lang="en-US"/>
+            </a:p>
+          </p:txBody>
+        </p:sp>
+        <p:pic>
+          <p:nvPicPr>
+            <p:cNvPr id="13" name="Picture 12"/>
+            <p:cNvPicPr>
+              <a:picLocks noChangeAspect="1"/>
+            </p:cNvPicPr>
+            <p:nvPr/>
+          </p:nvPicPr>
+          <p:blipFill>
+            <a:blip r:embed="rId5"/>
+            <a:stretch>
+              <a:fillRect/>
+            </a:stretch>
+          </p:blipFill>
+          <p:spPr>
+            <a:xfrm>
+              <a:off x="7066289" y="5628445"/>
+              <a:ext cx="2565270" cy="583886"/>
+            </a:xfrm>
+            <a:prstGeom prst="rect">
+              <a:avLst/>
+            </a:prstGeom>
+            <a:grpFill/>
+          </p:spPr>
+        </p:pic>
+      </p:grpSp>
+      <p:pic>
+        <p:nvPicPr>
+          <p:cNvPr id="16" name="Picture 15"/>
+          <p:cNvPicPr>
+            <a:picLocks noChangeAspect="1"/>
+          </p:cNvPicPr>
+          <p:nvPr/>
+        </p:nvPicPr>
+        <p:blipFill>
+          <a:blip r:embed="rId6">
+            <a:extLst>
+              <a:ext uri="{28A0092B-C50C-407E-A947-70E740481C1C}">
+                <a14:useLocalDpi xmlns:a14="http://schemas.microsoft.com/office/drawing/2010/main" val="0"/>
+              </a:ext>
+            </a:extLst>
+          </a:blip>
+          <a:stretch>
+            <a:fillRect/>
+          </a:stretch>
+        </p:blipFill>
+        <p:spPr>
+          <a:xfrm>
+            <a:off x="714258" y="1864443"/>
+            <a:ext cx="1755738" cy="1755738"/>
+          </a:xfrm>
+          <a:prstGeom prst="rect">
+            <a:avLst/>
+          </a:prstGeom>
+        </p:spPr>
+      </p:pic>
+      <p:sp>
+        <p:nvSpPr>
+          <p:cNvPr id="17" name="Rounded Rectangle 16"/>
+          <p:cNvSpPr/>
+          <p:nvPr/>
+        </p:nvSpPr>
+        <p:spPr>
+          <a:xfrm>
+            <a:off x="534359" y="4163249"/>
+            <a:ext cx="2727025" cy="982199"/>
+          </a:xfrm>
+          <a:prstGeom prst="roundRect">
+            <a:avLst/>
+          </a:prstGeom>
+        </p:spPr>
+        <p:style>
+          <a:lnRef idx="2">
+            <a:schemeClr val="accent1">
+              <a:shade val="50000"/>
+            </a:schemeClr>
+          </a:lnRef>
+          <a:fillRef idx="1">
+            <a:schemeClr val="accent1"/>
+          </a:fillRef>
+          <a:effectRef idx="0">
+            <a:schemeClr val="accent1"/>
+          </a:effectRef>
+          <a:fontRef idx="minor">
+            <a:schemeClr val="lt1"/>
+          </a:fontRef>
+        </p:style>
+        <p:txBody>
+          <a:bodyPr rtlCol="0" anchor="ctr"/>
+          <a:lstStyle/>
+          <a:p>
+            <a:pPr algn="ctr"/>
+            <a:r>
+              <a:rPr lang="en-US" dirty="0" smtClean="0"/>
+              <a:t>Docker Client</a:t>
+            </a:r>
+            <a:endParaRPr lang="en-US" dirty="0"/>
+          </a:p>
+        </p:txBody>
+      </p:sp>
+      <p:cxnSp>
+        <p:nvCxnSpPr>
+          <p:cNvPr id="19" name="Straight Arrow Connector 18"/>
+          <p:cNvCxnSpPr>
+            <a:stCxn id="17" idx="3"/>
+            <a:endCxn id="5" idx="2"/>
+          </p:cNvCxnSpPr>
+          <p:nvPr/>
+        </p:nvCxnSpPr>
+        <p:spPr>
+          <a:xfrm flipV="1">
+            <a:off x="3261384" y="3404555"/>
+            <a:ext cx="2049849" cy="1249794"/>
+          </a:xfrm>
+          <a:prstGeom prst="straightConnector1">
+            <a:avLst/>
+          </a:prstGeom>
+          <a:ln>
+            <a:tailEnd type="triangle"/>
+          </a:ln>
+        </p:spPr>
+        <p:style>
+          <a:lnRef idx="3">
+            <a:schemeClr val="accent1"/>
+          </a:lnRef>
+          <a:fillRef idx="0">
+            <a:schemeClr val="accent1"/>
+          </a:fillRef>
+          <a:effectRef idx="2">
+            <a:schemeClr val="accent1"/>
+          </a:effectRef>
+          <a:fontRef idx="minor">
+            <a:schemeClr val="tx1"/>
+          </a:fontRef>
+        </p:style>
+      </p:cxnSp>
+      <p:cxnSp>
+        <p:nvCxnSpPr>
+          <p:cNvPr id="21" name="Straight Arrow Connector 20"/>
+          <p:cNvCxnSpPr>
+            <a:stCxn id="17" idx="3"/>
+            <a:endCxn id="3" idx="2"/>
+          </p:cNvCxnSpPr>
+          <p:nvPr/>
+        </p:nvCxnSpPr>
+        <p:spPr>
+          <a:xfrm>
+            <a:off x="3261384" y="4654349"/>
+            <a:ext cx="2049912" cy="283958"/>
+          </a:xfrm>
+          <a:prstGeom prst="straightConnector1">
+            <a:avLst/>
+          </a:prstGeom>
+          <a:ln>
+            <a:tailEnd type="triangle"/>
+          </a:ln>
+        </p:spPr>
+        <p:style>
+          <a:lnRef idx="3">
+            <a:schemeClr val="accent1"/>
+          </a:lnRef>
+          <a:fillRef idx="0">
+            <a:schemeClr val="accent1"/>
+          </a:fillRef>
+          <a:effectRef idx="2">
+            <a:schemeClr val="accent1"/>
+          </a:effectRef>
+          <a:fontRef idx="minor">
+            <a:schemeClr val="tx1"/>
+          </a:fontRef>
+        </p:style>
+      </p:cxnSp>
+      <p:cxnSp>
+        <p:nvCxnSpPr>
+          <p:cNvPr id="23" name="Straight Arrow Connector 22"/>
+          <p:cNvCxnSpPr>
+            <a:stCxn id="17" idx="3"/>
+            <a:endCxn id="4" idx="2"/>
+          </p:cNvCxnSpPr>
+          <p:nvPr/>
+        </p:nvCxnSpPr>
+        <p:spPr>
+          <a:xfrm flipV="1">
+            <a:off x="3261384" y="1952922"/>
+            <a:ext cx="2162437" cy="2701427"/>
+          </a:xfrm>
+          <a:prstGeom prst="straightConnector1">
+            <a:avLst/>
+          </a:prstGeom>
+          <a:ln>
+            <a:tailEnd type="triangle"/>
+          </a:ln>
+        </p:spPr>
+        <p:style>
+          <a:lnRef idx="3">
+            <a:schemeClr val="accent1"/>
+          </a:lnRef>
+          <a:fillRef idx="0">
+            <a:schemeClr val="accent1"/>
+          </a:fillRef>
+          <a:effectRef idx="2">
+            <a:schemeClr val="accent1"/>
+          </a:effectRef>
+          <a:fontRef idx="minor">
+            <a:schemeClr val="tx1"/>
+          </a:fontRef>
+        </p:style>
+      </p:cxnSp>
+      <p:cxnSp>
+        <p:nvCxnSpPr>
+          <p:cNvPr id="25" name="Straight Arrow Connector 24"/>
+          <p:cNvCxnSpPr>
+            <a:stCxn id="17" idx="3"/>
+            <a:endCxn id="6" idx="3"/>
+          </p:cNvCxnSpPr>
+          <p:nvPr/>
+        </p:nvCxnSpPr>
+        <p:spPr>
+          <a:xfrm>
+            <a:off x="3261384" y="4654349"/>
+            <a:ext cx="2941988" cy="1310784"/>
+          </a:xfrm>
+          <a:prstGeom prst="straightConnector1">
+            <a:avLst/>
+          </a:prstGeom>
+          <a:ln>
+            <a:tailEnd type="triangle"/>
+          </a:ln>
+        </p:spPr>
+        <p:style>
+          <a:lnRef idx="3">
+            <a:schemeClr val="accent1"/>
+          </a:lnRef>
+          <a:fillRef idx="0">
+            <a:schemeClr val="accent1"/>
+          </a:fillRef>
+          <a:effectRef idx="2">
+            <a:schemeClr val="accent1"/>
+          </a:effectRef>
+          <a:fontRef idx="minor">
+            <a:schemeClr val="tx1"/>
+          </a:fontRef>
+        </p:style>
+      </p:cxnSp>
+      <p:cxnSp>
+        <p:nvCxnSpPr>
+          <p:cNvPr id="27" name="Straight Arrow Connector 26"/>
+          <p:cNvCxnSpPr>
+            <a:stCxn id="16" idx="2"/>
+            <a:endCxn id="17" idx="0"/>
+          </p:cNvCxnSpPr>
+          <p:nvPr/>
+        </p:nvCxnSpPr>
+        <p:spPr>
+          <a:xfrm>
+            <a:off x="1592127" y="3620181"/>
+            <a:ext cx="305745" cy="543068"/>
+          </a:xfrm>
+          <a:prstGeom prst="straightConnector1">
+            <a:avLst/>
+          </a:prstGeom>
+          <a:ln>
+            <a:tailEnd type="triangle"/>
+          </a:ln>
+        </p:spPr>
+        <p:style>
+          <a:lnRef idx="3">
+            <a:schemeClr val="accent1"/>
+          </a:lnRef>
+          <a:fillRef idx="0">
+            <a:schemeClr val="accent1"/>
+          </a:fillRef>
+          <a:effectRef idx="2">
+            <a:schemeClr val="accent1"/>
+          </a:effectRef>
+          <a:fontRef idx="minor">
+            <a:schemeClr val="tx1"/>
+          </a:fontRef>
+        </p:style>
+      </p:cxnSp>
+      <p:pic>
+        <p:nvPicPr>
+          <p:cNvPr id="34" name="Picture 33"/>
+          <p:cNvPicPr>
+            <a:picLocks noChangeAspect="1"/>
+          </p:cNvPicPr>
+          <p:nvPr/>
+        </p:nvPicPr>
+        <p:blipFill>
+          <a:blip r:embed="rId7" cstate="print">
+            <a:extLst>
+              <a:ext uri="{28A0092B-C50C-407E-A947-70E740481C1C}">
+                <a14:useLocalDpi xmlns:a14="http://schemas.microsoft.com/office/drawing/2010/main" val="0"/>
+              </a:ext>
+            </a:extLst>
+          </a:blip>
+          <a:stretch>
+            <a:fillRect/>
+          </a:stretch>
+        </p:blipFill>
+        <p:spPr>
+          <a:xfrm>
+            <a:off x="7435291" y="2605317"/>
+            <a:ext cx="2209696" cy="1472762"/>
+          </a:xfrm>
+          <a:prstGeom prst="rect">
+            <a:avLst/>
+          </a:prstGeom>
+        </p:spPr>
+      </p:pic>
+      <p:cxnSp>
+        <p:nvCxnSpPr>
+          <p:cNvPr id="36" name="Straight Arrow Connector 35"/>
+          <p:cNvCxnSpPr>
+            <a:stCxn id="34" idx="1"/>
+            <a:endCxn id="13" idx="3"/>
+          </p:cNvCxnSpPr>
+          <p:nvPr/>
+        </p:nvCxnSpPr>
+        <p:spPr>
+          <a:xfrm flipH="1">
+            <a:off x="6808135" y="3341698"/>
+            <a:ext cx="627156" cy="53864"/>
+          </a:xfrm>
+          <a:prstGeom prst="straightConnector1">
+            <a:avLst/>
+          </a:prstGeom>
+          <a:ln>
+            <a:headEnd type="triangle"/>
+            <a:tailEnd type="triangle"/>
+          </a:ln>
+        </p:spPr>
+        <p:style>
+          <a:lnRef idx="3">
+            <a:schemeClr val="accent1"/>
+          </a:lnRef>
+          <a:fillRef idx="0">
+            <a:schemeClr val="accent1"/>
+          </a:fillRef>
+          <a:effectRef idx="2">
+            <a:schemeClr val="accent1"/>
+          </a:effectRef>
+          <a:fontRef idx="minor">
+            <a:schemeClr val="tx1"/>
+          </a:fontRef>
+        </p:style>
+      </p:cxnSp>
+      <p:sp>
+        <p:nvSpPr>
+          <p:cNvPr id="37" name="TextBox 36"/>
+          <p:cNvSpPr txBox="1"/>
+          <p:nvPr/>
+        </p:nvSpPr>
+        <p:spPr>
+          <a:xfrm>
+            <a:off x="7483332" y="4331958"/>
+            <a:ext cx="2113613" cy="369332"/>
+          </a:xfrm>
+          <a:prstGeom prst="rect">
+            <a:avLst/>
+          </a:prstGeom>
+          <a:noFill/>
+        </p:spPr>
+        <p:txBody>
+          <a:bodyPr wrap="square" rtlCol="0">
+            <a:spAutoFit/>
+          </a:bodyPr>
+          <a:lstStyle/>
+          <a:p>
+            <a:r>
+              <a:rPr lang="en-US" dirty="0" smtClean="0"/>
+              <a:t>Your own cloud</a:t>
+            </a:r>
+            <a:endParaRPr lang="en-US" dirty="0"/>
+          </a:p>
+        </p:txBody>
+      </p:sp>
+    </p:spTree>
+    <p:extLst>
+      <p:ext uri="{BB962C8B-B14F-4D97-AF65-F5344CB8AC3E}">
+        <p14:creationId xmlns:p14="http://schemas.microsoft.com/office/powerpoint/2010/main" val="559745585"/>
+      </p:ext>
+    </p:extLst>
+  </p:cSld>
+  <p:clrMapOvr>
+    <a:masterClrMapping/>
+  </p:clrMapOvr>
+  <mc:AlternateContent xmlns:mc="http://schemas.openxmlformats.org/markup-compatibility/2006">
+    <mc:Choice xmlns:p14="http://schemas.microsoft.com/office/powerpoint/2010/main" Requires="p14">
+      <p:transition spd="med" p14:dur="700">
+        <p:fade/>
+      </p:transition>
+    </mc:Choice>
+    <mc:Fallback>
+      <p:transition spd="med">
+        <p:fade/>
+      </p:transition>
+    </mc:Fallback>
+  </mc:AlternateContent>
+  <p:timing>
+    <p:tnLst>
+      <p:par>
+        <p:cTn id="1" dur="indefinite" restart="never" nodeType="tmRoot"/>
+      </p:par>
+    </p:tnLst>
+  </p:timing>
+</p:sld>
+</file>
+
+<file path=ppt/slides/slide15.xml><?xml version="1.0" encoding="utf-8"?>
+<p:sld xmlns:a="http://schemas.openxmlformats.org/drawingml/2006/main" xmlns:r="http://schemas.openxmlformats.org/officeDocument/2006/relationships" xmlns:p="http://schemas.openxmlformats.org/presentationml/2006/main">
+  <p:cSld>
+    <p:spTree>
+      <p:nvGrpSpPr>
+        <p:cNvPr id="1" name=""/>
+        <p:cNvGrpSpPr/>
+        <p:nvPr/>
+      </p:nvGrpSpPr>
+      <p:grpSpPr>
+        <a:xfrm>
+          <a:off x="0" y="0"/>
+          <a:ext cx="0" cy="0"/>
+          <a:chOff x="0" y="0"/>
+          <a:chExt cx="0" cy="0"/>
+        </a:xfrm>
+      </p:grpSpPr>
+      <p:sp>
+        <p:nvSpPr>
+          <p:cNvPr id="2" name="Title 1"/>
+          <p:cNvSpPr>
+            <a:spLocks noGrp="1"/>
+          </p:cNvSpPr>
+          <p:nvPr>
+            <p:ph type="title"/>
+          </p:nvPr>
+        </p:nvSpPr>
+        <p:spPr/>
+        <p:txBody>
+          <a:bodyPr/>
+          <a:lstStyle/>
+          <a:p>
+            <a:r>
+              <a:rPr lang="en-US" dirty="0" smtClean="0"/>
+              <a:t>Point: The </a:t>
+            </a:r>
+            <a:r>
+              <a:rPr lang="en-US" i="1" dirty="0" smtClean="0"/>
+              <a:t>machines</a:t>
+            </a:r>
+            <a:r>
+              <a:rPr lang="en-US" dirty="0" smtClean="0"/>
+              <a:t> are one big machine</a:t>
+            </a:r>
+            <a:endParaRPr lang="en-US" dirty="0"/>
+          </a:p>
+        </p:txBody>
+      </p:sp>
+      <p:grpSp>
+        <p:nvGrpSpPr>
+          <p:cNvPr id="11" name="Group 10"/>
+          <p:cNvGrpSpPr/>
+          <p:nvPr/>
+        </p:nvGrpSpPr>
+        <p:grpSpPr>
+          <a:xfrm>
+            <a:off x="5348122" y="5888853"/>
+            <a:ext cx="1710499" cy="1334124"/>
+            <a:chOff x="1154242" y="2698230"/>
+            <a:chExt cx="2638269" cy="2038662"/>
+          </a:xfrm>
+          <a:solidFill>
+            <a:schemeClr val="tx1"/>
+          </a:solidFill>
+        </p:grpSpPr>
+        <p:sp>
+          <p:nvSpPr>
+            <p:cNvPr id="6" name="Cloud 5"/>
+            <p:cNvSpPr/>
+            <p:nvPr/>
+          </p:nvSpPr>
+          <p:spPr>
+            <a:xfrm>
+              <a:off x="1154242" y="2698230"/>
+              <a:ext cx="2638269" cy="2038662"/>
+            </a:xfrm>
+            <a:prstGeom prst="cloud">
+              <a:avLst/>
+            </a:prstGeom>
+            <a:grpFill/>
+          </p:spPr>
+          <p:style>
+            <a:lnRef idx="2">
+              <a:schemeClr val="accent1">
+                <a:shade val="50000"/>
+              </a:schemeClr>
+            </a:lnRef>
+            <a:fillRef idx="1">
+              <a:schemeClr val="accent1"/>
+            </a:fillRef>
+            <a:effectRef idx="0">
+              <a:schemeClr val="accent1"/>
+            </a:effectRef>
+            <a:fontRef idx="minor">
+              <a:schemeClr val="lt1"/>
+            </a:fontRef>
+          </p:style>
+          <p:txBody>
+            <a:bodyPr rtlCol="0" anchor="ctr"/>
+            <a:lstStyle/>
+            <a:p>
+              <a:pPr algn="ctr"/>
+              <a:endParaRPr lang="en-US"/>
+            </a:p>
+          </p:txBody>
+        </p:sp>
+        <p:pic>
+          <p:nvPicPr>
+            <p:cNvPr id="7" name="Picture 6"/>
+            <p:cNvPicPr>
+              <a:picLocks noChangeAspect="1"/>
+            </p:cNvPicPr>
+            <p:nvPr/>
+          </p:nvPicPr>
+          <p:blipFill>
+            <a:blip r:embed="rId2"/>
+            <a:stretch>
+              <a:fillRect/>
+            </a:stretch>
+          </p:blipFill>
+          <p:spPr>
+            <a:xfrm>
+              <a:off x="1770757" y="3441336"/>
+              <a:ext cx="1333500" cy="552450"/>
+            </a:xfrm>
+            <a:prstGeom prst="rect">
+              <a:avLst/>
+            </a:prstGeom>
+            <a:grpFill/>
+          </p:spPr>
+        </p:pic>
+      </p:grpSp>
+      <p:grpSp>
+        <p:nvGrpSpPr>
+          <p:cNvPr id="12" name="Group 11"/>
+          <p:cNvGrpSpPr/>
+          <p:nvPr/>
+        </p:nvGrpSpPr>
+        <p:grpSpPr>
+          <a:xfrm>
+            <a:off x="5419783" y="1418225"/>
+            <a:ext cx="1301647" cy="1069394"/>
+            <a:chOff x="6103495" y="1801319"/>
+            <a:chExt cx="2638269" cy="2038662"/>
+          </a:xfrm>
+          <a:solidFill>
+            <a:schemeClr val="tx1"/>
+          </a:solidFill>
+        </p:grpSpPr>
+        <p:sp>
+          <p:nvSpPr>
+            <p:cNvPr id="4" name="Cloud 3"/>
+            <p:cNvSpPr/>
+            <p:nvPr/>
+          </p:nvSpPr>
+          <p:spPr>
+            <a:xfrm>
+              <a:off x="6103495" y="1801319"/>
+              <a:ext cx="2638269" cy="2038662"/>
+            </a:xfrm>
+            <a:prstGeom prst="cloud">
+              <a:avLst/>
+            </a:prstGeom>
+            <a:grpFill/>
+          </p:spPr>
+          <p:style>
+            <a:lnRef idx="2">
+              <a:schemeClr val="accent1">
+                <a:shade val="50000"/>
+              </a:schemeClr>
+            </a:lnRef>
+            <a:fillRef idx="1">
+              <a:schemeClr val="accent1"/>
+            </a:fillRef>
+            <a:effectRef idx="0">
+              <a:schemeClr val="accent1"/>
+            </a:effectRef>
+            <a:fontRef idx="minor">
+              <a:schemeClr val="lt1"/>
+            </a:fontRef>
+          </p:style>
+          <p:txBody>
+            <a:bodyPr rtlCol="0" anchor="ctr"/>
+            <a:lstStyle/>
+            <a:p>
+              <a:pPr algn="ctr"/>
+              <a:endParaRPr lang="en-US"/>
+            </a:p>
+          </p:txBody>
+        </p:sp>
+        <p:pic>
+          <p:nvPicPr>
+            <p:cNvPr id="8" name="Picture 7"/>
+            <p:cNvPicPr>
+              <a:picLocks noChangeAspect="1"/>
+            </p:cNvPicPr>
+            <p:nvPr/>
+          </p:nvPicPr>
+          <p:blipFill>
+            <a:blip r:embed="rId3"/>
+            <a:stretch>
+              <a:fillRect/>
+            </a:stretch>
+          </p:blipFill>
+          <p:spPr>
+            <a:xfrm>
+              <a:off x="6435999" y="2443850"/>
+              <a:ext cx="1876425" cy="609600"/>
+            </a:xfrm>
+            <a:prstGeom prst="rect">
+              <a:avLst/>
+            </a:prstGeom>
+            <a:grpFill/>
+          </p:spPr>
+        </p:pic>
+      </p:grpSp>
+      <p:grpSp>
+        <p:nvGrpSpPr>
+          <p:cNvPr id="10" name="Group 9"/>
+          <p:cNvGrpSpPr/>
+          <p:nvPr/>
+        </p:nvGrpSpPr>
+        <p:grpSpPr>
+          <a:xfrm>
+            <a:off x="5306575" y="4342754"/>
+            <a:ext cx="1522138" cy="1191106"/>
+            <a:chOff x="3104255" y="4916775"/>
+            <a:chExt cx="2638269" cy="2038662"/>
+          </a:xfrm>
+          <a:solidFill>
+            <a:schemeClr val="tx1"/>
+          </a:solidFill>
+        </p:grpSpPr>
+        <p:sp>
+          <p:nvSpPr>
+            <p:cNvPr id="3" name="Cloud 2"/>
+            <p:cNvSpPr/>
+            <p:nvPr/>
+          </p:nvSpPr>
+          <p:spPr>
+            <a:xfrm>
+              <a:off x="3104255" y="4916775"/>
+              <a:ext cx="2638269" cy="2038662"/>
+            </a:xfrm>
+            <a:prstGeom prst="cloud">
+              <a:avLst/>
+            </a:prstGeom>
+            <a:grpFill/>
+          </p:spPr>
+          <p:style>
+            <a:lnRef idx="2">
+              <a:schemeClr val="accent1">
+                <a:shade val="50000"/>
+              </a:schemeClr>
+            </a:lnRef>
+            <a:fillRef idx="1">
+              <a:schemeClr val="accent1"/>
+            </a:fillRef>
+            <a:effectRef idx="0">
+              <a:schemeClr val="accent1"/>
+            </a:effectRef>
+            <a:fontRef idx="minor">
+              <a:schemeClr val="lt1"/>
+            </a:fontRef>
+          </p:style>
+          <p:txBody>
+            <a:bodyPr rtlCol="0" anchor="ctr"/>
+            <a:lstStyle/>
+            <a:p>
+              <a:pPr algn="ctr"/>
+              <a:endParaRPr lang="en-US"/>
+            </a:p>
+          </p:txBody>
+        </p:sp>
+        <p:pic>
+          <p:nvPicPr>
+            <p:cNvPr id="9" name="Picture 8"/>
+            <p:cNvPicPr>
+              <a:picLocks noChangeAspect="1"/>
+            </p:cNvPicPr>
+            <p:nvPr/>
+          </p:nvPicPr>
+          <p:blipFill>
+            <a:blip r:embed="rId4"/>
+            <a:stretch>
+              <a:fillRect/>
+            </a:stretch>
+          </p:blipFill>
+          <p:spPr>
+            <a:xfrm>
+              <a:off x="3418503" y="5530434"/>
+              <a:ext cx="2009775" cy="590550"/>
+            </a:xfrm>
+            <a:prstGeom prst="rect">
+              <a:avLst/>
+            </a:prstGeom>
+            <a:grpFill/>
+          </p:spPr>
+        </p:pic>
+      </p:grpSp>
+      <p:grpSp>
+        <p:nvGrpSpPr>
+          <p:cNvPr id="14" name="Group 13"/>
+          <p:cNvGrpSpPr/>
+          <p:nvPr/>
+        </p:nvGrpSpPr>
+        <p:grpSpPr>
+          <a:xfrm>
+            <a:off x="5306575" y="2821349"/>
+            <a:ext cx="1501560" cy="1166412"/>
+            <a:chOff x="6993290" y="4916775"/>
+            <a:chExt cx="2638269" cy="2038662"/>
+          </a:xfrm>
+          <a:solidFill>
+            <a:schemeClr val="tx1"/>
+          </a:solidFill>
+        </p:grpSpPr>
+        <p:sp>
+          <p:nvSpPr>
+            <p:cNvPr id="5" name="Cloud 4"/>
+            <p:cNvSpPr/>
+            <p:nvPr/>
+          </p:nvSpPr>
+          <p:spPr>
+            <a:xfrm>
+              <a:off x="6993290" y="4916775"/>
+              <a:ext cx="2638269" cy="2038662"/>
+            </a:xfrm>
+            <a:prstGeom prst="cloud">
+              <a:avLst/>
+            </a:prstGeom>
+            <a:grpFill/>
+          </p:spPr>
+          <p:style>
+            <a:lnRef idx="2">
+              <a:schemeClr val="accent1">
+                <a:shade val="50000"/>
+              </a:schemeClr>
+            </a:lnRef>
+            <a:fillRef idx="1">
+              <a:schemeClr val="accent1"/>
+            </a:fillRef>
+            <a:effectRef idx="0">
+              <a:schemeClr val="accent1"/>
+            </a:effectRef>
+            <a:fontRef idx="minor">
+              <a:schemeClr val="lt1"/>
+            </a:fontRef>
+          </p:style>
+          <p:txBody>
+            <a:bodyPr rtlCol="0" anchor="ctr"/>
+            <a:lstStyle/>
+            <a:p>
+              <a:pPr algn="ctr"/>
+              <a:endParaRPr lang="en-US"/>
+            </a:p>
+          </p:txBody>
+        </p:sp>
+        <p:pic>
+          <p:nvPicPr>
+            <p:cNvPr id="13" name="Picture 12"/>
+            <p:cNvPicPr>
+              <a:picLocks noChangeAspect="1"/>
+            </p:cNvPicPr>
+            <p:nvPr/>
+          </p:nvPicPr>
+          <p:blipFill>
+            <a:blip r:embed="rId5"/>
+            <a:stretch>
+              <a:fillRect/>
+            </a:stretch>
+          </p:blipFill>
+          <p:spPr>
+            <a:xfrm>
+              <a:off x="7066289" y="5628445"/>
+              <a:ext cx="2565270" cy="583886"/>
+            </a:xfrm>
+            <a:prstGeom prst="rect">
+              <a:avLst/>
+            </a:prstGeom>
+            <a:grpFill/>
+          </p:spPr>
+        </p:pic>
+      </p:grpSp>
+      <p:pic>
+        <p:nvPicPr>
+          <p:cNvPr id="16" name="Picture 15"/>
+          <p:cNvPicPr>
+            <a:picLocks noChangeAspect="1"/>
+          </p:cNvPicPr>
+          <p:nvPr/>
+        </p:nvPicPr>
+        <p:blipFill>
+          <a:blip r:embed="rId6">
+            <a:extLst>
+              <a:ext uri="{28A0092B-C50C-407E-A947-70E740481C1C}">
+                <a14:useLocalDpi xmlns:a14="http://schemas.microsoft.com/office/drawing/2010/main" val="0"/>
+              </a:ext>
+            </a:extLst>
+          </a:blip>
+          <a:stretch>
+            <a:fillRect/>
+          </a:stretch>
+        </p:blipFill>
+        <p:spPr>
+          <a:xfrm>
+            <a:off x="714258" y="1864443"/>
+            <a:ext cx="1755738" cy="1755738"/>
+          </a:xfrm>
+          <a:prstGeom prst="rect">
+            <a:avLst/>
+          </a:prstGeom>
+        </p:spPr>
+      </p:pic>
+      <p:sp>
+        <p:nvSpPr>
+          <p:cNvPr id="17" name="Rounded Rectangle 16"/>
+          <p:cNvSpPr/>
+          <p:nvPr/>
+        </p:nvSpPr>
+        <p:spPr>
+          <a:xfrm>
+            <a:off x="534359" y="4163249"/>
+            <a:ext cx="2727025" cy="982199"/>
+          </a:xfrm>
+          <a:prstGeom prst="roundRect">
+            <a:avLst/>
+          </a:prstGeom>
+        </p:spPr>
+        <p:style>
+          <a:lnRef idx="2">
+            <a:schemeClr val="accent1">
+              <a:shade val="50000"/>
+            </a:schemeClr>
+          </a:lnRef>
+          <a:fillRef idx="1">
+            <a:schemeClr val="accent1"/>
+          </a:fillRef>
+          <a:effectRef idx="0">
+            <a:schemeClr val="accent1"/>
+          </a:effectRef>
+          <a:fontRef idx="minor">
+            <a:schemeClr val="lt1"/>
+          </a:fontRef>
+        </p:style>
+        <p:txBody>
+          <a:bodyPr rtlCol="0" anchor="ctr"/>
+          <a:lstStyle/>
+          <a:p>
+            <a:pPr algn="ctr"/>
+            <a:r>
+              <a:rPr lang="en-US" dirty="0" smtClean="0"/>
+              <a:t>Docker Client</a:t>
+            </a:r>
+            <a:endParaRPr lang="en-US" dirty="0"/>
+          </a:p>
+        </p:txBody>
+      </p:sp>
+      <p:cxnSp>
+        <p:nvCxnSpPr>
+          <p:cNvPr id="19" name="Straight Arrow Connector 18"/>
+          <p:cNvCxnSpPr>
+            <a:stCxn id="17" idx="3"/>
+            <a:endCxn id="5" idx="2"/>
+          </p:cNvCxnSpPr>
+          <p:nvPr/>
+        </p:nvCxnSpPr>
+        <p:spPr>
+          <a:xfrm flipV="1">
+            <a:off x="3261384" y="3404555"/>
+            <a:ext cx="2049849" cy="1249794"/>
+          </a:xfrm>
+          <a:prstGeom prst="straightConnector1">
+            <a:avLst/>
+          </a:prstGeom>
+          <a:ln>
+            <a:tailEnd type="triangle"/>
+          </a:ln>
+        </p:spPr>
+        <p:style>
+          <a:lnRef idx="3">
+            <a:schemeClr val="accent1"/>
+          </a:lnRef>
+          <a:fillRef idx="0">
+            <a:schemeClr val="accent1"/>
+          </a:fillRef>
+          <a:effectRef idx="2">
+            <a:schemeClr val="accent1"/>
+          </a:effectRef>
+          <a:fontRef idx="minor">
+            <a:schemeClr val="tx1"/>
+          </a:fontRef>
+        </p:style>
+      </p:cxnSp>
+      <p:cxnSp>
+        <p:nvCxnSpPr>
+          <p:cNvPr id="21" name="Straight Arrow Connector 20"/>
+          <p:cNvCxnSpPr>
+            <a:stCxn id="17" idx="3"/>
+            <a:endCxn id="3" idx="2"/>
+          </p:cNvCxnSpPr>
+          <p:nvPr/>
+        </p:nvCxnSpPr>
+        <p:spPr>
+          <a:xfrm>
+            <a:off x="3261384" y="4654349"/>
+            <a:ext cx="2049912" cy="283958"/>
+          </a:xfrm>
+          <a:prstGeom prst="straightConnector1">
+            <a:avLst/>
+          </a:prstGeom>
+          <a:ln>
+            <a:tailEnd type="triangle"/>
+          </a:ln>
+        </p:spPr>
+        <p:style>
+          <a:lnRef idx="3">
+            <a:schemeClr val="accent1"/>
+          </a:lnRef>
+          <a:fillRef idx="0">
+            <a:schemeClr val="accent1"/>
+          </a:fillRef>
+          <a:effectRef idx="2">
+            <a:schemeClr val="accent1"/>
+          </a:effectRef>
+          <a:fontRef idx="minor">
+            <a:schemeClr val="tx1"/>
+          </a:fontRef>
+        </p:style>
+      </p:cxnSp>
+      <p:cxnSp>
+        <p:nvCxnSpPr>
+          <p:cNvPr id="23" name="Straight Arrow Connector 22"/>
+          <p:cNvCxnSpPr>
+            <a:stCxn id="17" idx="3"/>
+            <a:endCxn id="4" idx="2"/>
+          </p:cNvCxnSpPr>
+          <p:nvPr/>
+        </p:nvCxnSpPr>
+        <p:spPr>
+          <a:xfrm flipV="1">
+            <a:off x="3261384" y="1952922"/>
+            <a:ext cx="2162437" cy="2701427"/>
+          </a:xfrm>
+          <a:prstGeom prst="straightConnector1">
+            <a:avLst/>
+          </a:prstGeom>
+          <a:ln>
+            <a:tailEnd type="triangle"/>
+          </a:ln>
+        </p:spPr>
+        <p:style>
+          <a:lnRef idx="3">
+            <a:schemeClr val="accent1"/>
+          </a:lnRef>
+          <a:fillRef idx="0">
+            <a:schemeClr val="accent1"/>
+          </a:fillRef>
+          <a:effectRef idx="2">
+            <a:schemeClr val="accent1"/>
+          </a:effectRef>
+          <a:fontRef idx="minor">
+            <a:schemeClr val="tx1"/>
+          </a:fontRef>
+        </p:style>
+      </p:cxnSp>
+      <p:cxnSp>
+        <p:nvCxnSpPr>
+          <p:cNvPr id="25" name="Straight Arrow Connector 24"/>
+          <p:cNvCxnSpPr>
+            <a:stCxn id="17" idx="3"/>
+            <a:endCxn id="6" idx="3"/>
+          </p:cNvCxnSpPr>
+          <p:nvPr/>
+        </p:nvCxnSpPr>
+        <p:spPr>
+          <a:xfrm>
+            <a:off x="3261384" y="4654349"/>
+            <a:ext cx="2941988" cy="1310784"/>
+          </a:xfrm>
+          <a:prstGeom prst="straightConnector1">
+            <a:avLst/>
+          </a:prstGeom>
+          <a:ln>
+            <a:tailEnd type="triangle"/>
+          </a:ln>
+        </p:spPr>
+        <p:style>
+          <a:lnRef idx="3">
+            <a:schemeClr val="accent1"/>
+          </a:lnRef>
+          <a:fillRef idx="0">
+            <a:schemeClr val="accent1"/>
+          </a:fillRef>
+          <a:effectRef idx="2">
+            <a:schemeClr val="accent1"/>
+          </a:effectRef>
+          <a:fontRef idx="minor">
+            <a:schemeClr val="tx1"/>
+          </a:fontRef>
+        </p:style>
+      </p:cxnSp>
+      <p:cxnSp>
+        <p:nvCxnSpPr>
+          <p:cNvPr id="27" name="Straight Arrow Connector 26"/>
+          <p:cNvCxnSpPr>
+            <a:stCxn id="16" idx="2"/>
+            <a:endCxn id="17" idx="0"/>
+          </p:cNvCxnSpPr>
+          <p:nvPr/>
+        </p:nvCxnSpPr>
+        <p:spPr>
+          <a:xfrm>
+            <a:off x="1592127" y="3620181"/>
+            <a:ext cx="305745" cy="543068"/>
+          </a:xfrm>
+          <a:prstGeom prst="straightConnector1">
+            <a:avLst/>
+          </a:prstGeom>
+          <a:ln>
+            <a:tailEnd type="triangle"/>
+          </a:ln>
+        </p:spPr>
+        <p:style>
+          <a:lnRef idx="3">
+            <a:schemeClr val="accent1"/>
+          </a:lnRef>
+          <a:fillRef idx="0">
+            <a:schemeClr val="accent1"/>
+          </a:fillRef>
+          <a:effectRef idx="2">
+            <a:schemeClr val="accent1"/>
+          </a:effectRef>
+          <a:fontRef idx="minor">
+            <a:schemeClr val="tx1"/>
+          </a:fontRef>
+        </p:style>
+      </p:cxnSp>
+      <p:pic>
+        <p:nvPicPr>
+          <p:cNvPr id="34" name="Picture 33"/>
+          <p:cNvPicPr>
+            <a:picLocks noChangeAspect="1"/>
+          </p:cNvPicPr>
+          <p:nvPr/>
+        </p:nvPicPr>
+        <p:blipFill>
+          <a:blip r:embed="rId7" cstate="print">
+            <a:extLst>
+              <a:ext uri="{28A0092B-C50C-407E-A947-70E740481C1C}">
+                <a14:useLocalDpi xmlns:a14="http://schemas.microsoft.com/office/drawing/2010/main" val="0"/>
+              </a:ext>
+            </a:extLst>
+          </a:blip>
+          <a:stretch>
+            <a:fillRect/>
+          </a:stretch>
+        </p:blipFill>
+        <p:spPr>
+          <a:xfrm>
+            <a:off x="7435291" y="2605317"/>
+            <a:ext cx="2209696" cy="1472762"/>
+          </a:xfrm>
+          <a:prstGeom prst="rect">
+            <a:avLst/>
+          </a:prstGeom>
+        </p:spPr>
+      </p:pic>
+      <p:cxnSp>
+        <p:nvCxnSpPr>
+          <p:cNvPr id="36" name="Straight Arrow Connector 35"/>
+          <p:cNvCxnSpPr>
+            <a:stCxn id="34" idx="1"/>
+            <a:endCxn id="13" idx="3"/>
+          </p:cNvCxnSpPr>
+          <p:nvPr/>
+        </p:nvCxnSpPr>
+        <p:spPr>
+          <a:xfrm flipH="1">
+            <a:off x="6808135" y="3341698"/>
+            <a:ext cx="627156" cy="53864"/>
+          </a:xfrm>
+          <a:prstGeom prst="straightConnector1">
+            <a:avLst/>
+          </a:prstGeom>
+          <a:ln>
+            <a:headEnd type="triangle"/>
+            <a:tailEnd type="triangle"/>
+          </a:ln>
+        </p:spPr>
+        <p:style>
+          <a:lnRef idx="3">
+            <a:schemeClr val="accent1"/>
+          </a:lnRef>
+          <a:fillRef idx="0">
+            <a:schemeClr val="accent1"/>
+          </a:fillRef>
+          <a:effectRef idx="2">
+            <a:schemeClr val="accent1"/>
+          </a:effectRef>
+          <a:fontRef idx="minor">
+            <a:schemeClr val="tx1"/>
+          </a:fontRef>
+        </p:style>
+      </p:cxnSp>
+      <p:sp>
+        <p:nvSpPr>
+          <p:cNvPr id="37" name="TextBox 36"/>
+          <p:cNvSpPr txBox="1"/>
+          <p:nvPr/>
+        </p:nvSpPr>
+        <p:spPr>
+          <a:xfrm>
+            <a:off x="7483332" y="4331958"/>
+            <a:ext cx="2113613" cy="369332"/>
+          </a:xfrm>
+          <a:prstGeom prst="rect">
+            <a:avLst/>
+          </a:prstGeom>
+          <a:noFill/>
+        </p:spPr>
+        <p:txBody>
+          <a:bodyPr wrap="square" rtlCol="0">
+            <a:spAutoFit/>
+          </a:bodyPr>
+          <a:lstStyle/>
+          <a:p>
+            <a:r>
+              <a:rPr lang="en-US" dirty="0" smtClean="0"/>
+              <a:t>Your own cloud</a:t>
+            </a:r>
+            <a:endParaRPr lang="en-US" dirty="0"/>
+          </a:p>
+        </p:txBody>
+      </p:sp>
+      <p:pic>
+        <p:nvPicPr>
+          <p:cNvPr id="15" name="Picture 14"/>
+          <p:cNvPicPr>
+            <a:picLocks noChangeAspect="1"/>
+          </p:cNvPicPr>
+          <p:nvPr/>
+        </p:nvPicPr>
+        <p:blipFill>
+          <a:blip r:embed="rId8" cstate="print">
+            <a:extLst>
+              <a:ext uri="{28A0092B-C50C-407E-A947-70E740481C1C}">
+                <a14:useLocalDpi xmlns:a14="http://schemas.microsoft.com/office/drawing/2010/main" val="0"/>
+              </a:ext>
+            </a:extLst>
+          </a:blip>
+          <a:stretch>
+            <a:fillRect/>
+          </a:stretch>
+        </p:blipFill>
+        <p:spPr>
+          <a:xfrm>
+            <a:off x="404071" y="5888853"/>
+            <a:ext cx="1682436" cy="1264506"/>
+          </a:xfrm>
+          <a:prstGeom prst="rect">
+            <a:avLst/>
+          </a:prstGeom>
+        </p:spPr>
+      </p:pic>
+      <p:pic>
+        <p:nvPicPr>
+          <p:cNvPr id="26" name="Picture 25"/>
+          <p:cNvPicPr>
+            <a:picLocks noChangeAspect="1"/>
+          </p:cNvPicPr>
+          <p:nvPr/>
+        </p:nvPicPr>
+        <p:blipFill>
+          <a:blip r:embed="rId8" cstate="print">
+            <a:extLst>
+              <a:ext uri="{28A0092B-C50C-407E-A947-70E740481C1C}">
+                <a14:useLocalDpi xmlns:a14="http://schemas.microsoft.com/office/drawing/2010/main" val="0"/>
+              </a:ext>
+            </a:extLst>
+          </a:blip>
+          <a:stretch>
+            <a:fillRect/>
+          </a:stretch>
+        </p:blipFill>
+        <p:spPr>
+          <a:xfrm>
+            <a:off x="1468401" y="6182524"/>
+            <a:ext cx="1682436" cy="1264506"/>
+          </a:xfrm>
+          <a:prstGeom prst="rect">
+            <a:avLst/>
+          </a:prstGeom>
+        </p:spPr>
+      </p:pic>
+      <p:pic>
+        <p:nvPicPr>
+          <p:cNvPr id="28" name="Picture 27"/>
+          <p:cNvPicPr>
+            <a:picLocks noChangeAspect="1"/>
+          </p:cNvPicPr>
+          <p:nvPr/>
+        </p:nvPicPr>
+        <p:blipFill>
+          <a:blip r:embed="rId8" cstate="print">
+            <a:extLst>
+              <a:ext uri="{28A0092B-C50C-407E-A947-70E740481C1C}">
+                <a14:useLocalDpi xmlns:a14="http://schemas.microsoft.com/office/drawing/2010/main" val="0"/>
+              </a:ext>
+            </a:extLst>
+          </a:blip>
+          <a:stretch>
+            <a:fillRect/>
+          </a:stretch>
+        </p:blipFill>
+        <p:spPr>
+          <a:xfrm>
+            <a:off x="3145255" y="5640878"/>
+            <a:ext cx="1682436" cy="1264506"/>
+          </a:xfrm>
+          <a:prstGeom prst="rect">
+            <a:avLst/>
+          </a:prstGeom>
+        </p:spPr>
+      </p:pic>
+      <p:cxnSp>
+        <p:nvCxnSpPr>
+          <p:cNvPr id="20" name="Straight Arrow Connector 19"/>
+          <p:cNvCxnSpPr>
+            <a:stCxn id="17" idx="2"/>
+            <a:endCxn id="15" idx="0"/>
+          </p:cNvCxnSpPr>
+          <p:nvPr/>
+        </p:nvCxnSpPr>
+        <p:spPr>
+          <a:xfrm flipH="1">
+            <a:off x="1245289" y="5145448"/>
+            <a:ext cx="652583" cy="743405"/>
+          </a:xfrm>
+          <a:prstGeom prst="straightConnector1">
+            <a:avLst/>
+          </a:prstGeom>
+          <a:ln>
+            <a:tailEnd type="triangle"/>
+          </a:ln>
+        </p:spPr>
+        <p:style>
+          <a:lnRef idx="3">
+            <a:schemeClr val="accent1"/>
+          </a:lnRef>
+          <a:fillRef idx="0">
+            <a:schemeClr val="accent1"/>
+          </a:fillRef>
+          <a:effectRef idx="2">
+            <a:schemeClr val="accent1"/>
+          </a:effectRef>
+          <a:fontRef idx="minor">
+            <a:schemeClr val="tx1"/>
+          </a:fontRef>
+        </p:style>
+      </p:cxnSp>
+      <p:cxnSp>
+        <p:nvCxnSpPr>
+          <p:cNvPr id="30" name="Straight Arrow Connector 29"/>
+          <p:cNvCxnSpPr>
+            <a:stCxn id="17" idx="2"/>
+            <a:endCxn id="26" idx="0"/>
+          </p:cNvCxnSpPr>
+          <p:nvPr/>
+        </p:nvCxnSpPr>
+        <p:spPr>
+          <a:xfrm>
+            <a:off x="1897872" y="5145448"/>
+            <a:ext cx="411747" cy="1037076"/>
+          </a:xfrm>
+          <a:prstGeom prst="straightConnector1">
+            <a:avLst/>
+          </a:prstGeom>
+          <a:ln>
+            <a:tailEnd type="triangle"/>
+          </a:ln>
+        </p:spPr>
+        <p:style>
+          <a:lnRef idx="3">
+            <a:schemeClr val="accent1"/>
+          </a:lnRef>
+          <a:fillRef idx="0">
+            <a:schemeClr val="accent1"/>
+          </a:fillRef>
+          <a:effectRef idx="2">
+            <a:schemeClr val="accent1"/>
+          </a:effectRef>
+          <a:fontRef idx="minor">
+            <a:schemeClr val="tx1"/>
+          </a:fontRef>
+        </p:style>
+      </p:cxnSp>
+      <p:cxnSp>
+        <p:nvCxnSpPr>
+          <p:cNvPr id="31" name="Straight Arrow Connector 30"/>
+          <p:cNvCxnSpPr>
+            <a:stCxn id="17" idx="2"/>
+            <a:endCxn id="28" idx="0"/>
+          </p:cNvCxnSpPr>
+          <p:nvPr/>
+        </p:nvCxnSpPr>
+        <p:spPr>
+          <a:xfrm>
+            <a:off x="1897872" y="5145448"/>
+            <a:ext cx="2088601" cy="495430"/>
+          </a:xfrm>
+          <a:prstGeom prst="straightConnector1">
+            <a:avLst/>
+          </a:prstGeom>
+          <a:ln>
+            <a:tailEnd type="triangle"/>
+          </a:ln>
+        </p:spPr>
+        <p:style>
+          <a:lnRef idx="3">
+            <a:schemeClr val="accent1"/>
+          </a:lnRef>
+          <a:fillRef idx="0">
+            <a:schemeClr val="accent1"/>
+          </a:fillRef>
+          <a:effectRef idx="2">
+            <a:schemeClr val="accent1"/>
+          </a:effectRef>
+          <a:fontRef idx="minor">
+            <a:schemeClr val="tx1"/>
+          </a:fontRef>
+        </p:style>
+      </p:cxnSp>
+    </p:spTree>
+    <p:extLst>
+      <p:ext uri="{BB962C8B-B14F-4D97-AF65-F5344CB8AC3E}">
+        <p14:creationId xmlns:p14="http://schemas.microsoft.com/office/powerpoint/2010/main" val="538062569"/>
+      </p:ext>
+    </p:extLst>
+  </p:cSld>
+  <p:clrMapOvr>
+    <a:masterClrMapping/>
+  </p:clrMapOvr>
+  <mc:AlternateContent xmlns:mc="http://schemas.openxmlformats.org/markup-compatibility/2006">
+    <mc:Choice xmlns:p14="http://schemas.microsoft.com/office/powerpoint/2010/main" Requires="p14">
+      <p:transition spd="med" p14:dur="700">
+        <p:fade/>
+      </p:transition>
+    </mc:Choice>
+    <mc:Fallback>
+      <p:transition spd="med">
+        <p:fade/>
+      </p:transition>
+    </mc:Fallback>
+  </mc:AlternateContent>
+  <p:timing>
+    <p:tnLst>
+      <p:par>
+        <p:cTn id="1" dur="indefinite" restart="never" nodeType="tmRoot"/>
+      </p:par>
+    </p:tnLst>
+  </p:timing>
+</p:sld>
+</file>
+
+<file path=ppt/slides/slide16.xml><?xml version="1.0" encoding="utf-8"?>
+<p:sld xmlns:a="http://schemas.openxmlformats.org/drawingml/2006/main" xmlns:r="http://schemas.openxmlformats.org/officeDocument/2006/relationships" xmlns:p="http://schemas.openxmlformats.org/presentationml/2006/main">
+  <p:cSld>
+    <p:spTree>
+      <p:nvGrpSpPr>
+        <p:cNvPr id="1" name=""/>
+        <p:cNvGrpSpPr/>
+        <p:nvPr/>
+      </p:nvGrpSpPr>
+      <p:grpSpPr>
+        <a:xfrm>
+          <a:off x="0" y="0"/>
+          <a:ext cx="0" cy="0"/>
+          <a:chOff x="0" y="0"/>
+          <a:chExt cx="0" cy="0"/>
+        </a:xfrm>
+      </p:grpSpPr>
+      <p:sp>
+        <p:nvSpPr>
+          <p:cNvPr id="2" name="Title 1"/>
+          <p:cNvSpPr>
+            <a:spLocks noGrp="1"/>
+          </p:cNvSpPr>
+          <p:nvPr>
+            <p:ph type="title"/>
+          </p:nvPr>
+        </p:nvSpPr>
+        <p:spPr/>
+        <p:txBody>
+          <a:bodyPr/>
+          <a:lstStyle/>
+          <a:p>
+            <a:r>
+              <a:rPr lang="en-US" dirty="0" smtClean="0"/>
+              <a:t>Think I’m kidding?</a:t>
+            </a:r>
+            <a:endParaRPr lang="en-US" dirty="0"/>
+          </a:p>
+        </p:txBody>
+      </p:sp>
+      <p:pic>
+        <p:nvPicPr>
+          <p:cNvPr id="3" name="Picture 2"/>
+          <p:cNvPicPr>
+            <a:picLocks noChangeAspect="1"/>
+          </p:cNvPicPr>
+          <p:nvPr/>
+        </p:nvPicPr>
+        <p:blipFill>
+          <a:blip r:embed="rId2"/>
+          <a:stretch>
+            <a:fillRect/>
+          </a:stretch>
+        </p:blipFill>
+        <p:spPr>
+          <a:xfrm>
+            <a:off x="534359" y="1668109"/>
+            <a:ext cx="8700102" cy="4772208"/>
+          </a:xfrm>
+          <a:prstGeom prst="rect">
+            <a:avLst/>
+          </a:prstGeom>
+        </p:spPr>
+      </p:pic>
+      <p:sp>
+        <p:nvSpPr>
+          <p:cNvPr id="4" name="TextBox 3"/>
+          <p:cNvSpPr txBox="1"/>
+          <p:nvPr/>
+        </p:nvSpPr>
+        <p:spPr>
+          <a:xfrm>
+            <a:off x="354479" y="6865495"/>
+            <a:ext cx="9546266" cy="369332"/>
+          </a:xfrm>
+          <a:prstGeom prst="rect">
+            <a:avLst/>
+          </a:prstGeom>
+          <a:noFill/>
+        </p:spPr>
+        <p:txBody>
+          <a:bodyPr wrap="square" rtlCol="0">
+            <a:spAutoFit/>
+          </a:bodyPr>
+          <a:lstStyle/>
+          <a:p>
+            <a:r>
+              <a:rPr lang="en-US" dirty="0" smtClean="0"/>
+              <a:t>https://www.kickstarter.com/projects/1598272670/chip-the-worlds-first-9-computer</a:t>
+            </a:r>
+            <a:endParaRPr lang="en-US" dirty="0"/>
+          </a:p>
+        </p:txBody>
+      </p:sp>
+    </p:spTree>
+    <p:extLst>
+      <p:ext uri="{BB962C8B-B14F-4D97-AF65-F5344CB8AC3E}">
+        <p14:creationId xmlns:p14="http://schemas.microsoft.com/office/powerpoint/2010/main" val="3412816678"/>
+      </p:ext>
+    </p:extLst>
+  </p:cSld>
+  <p:clrMapOvr>
+    <a:masterClrMapping/>
+  </p:clrMapOvr>
+  <p:timing>
+    <p:tnLst>
+      <p:par>
+        <p:cTn id="1" dur="indefinite" restart="never" nodeType="tmRoot"/>
+      </p:par>
+    </p:tnLst>
+  </p:timing>
+</p:sld>
+</file>
+
 <file path=ppt/slides/slide2.xml><?xml version="1.0" encoding="utf-8"?>
 <p:sld xmlns:a="http://schemas.openxmlformats.org/drawingml/2006/main" xmlns:r="http://schemas.openxmlformats.org/officeDocument/2006/relationships" xmlns:p="http://schemas.openxmlformats.org/presentationml/2006/main">
   <p:cSld>
@@ -6602,16 +9755,21 @@
             <p:ph idx="1"/>
           </p:nvPr>
         </p:nvSpPr>
-        <p:spPr/>
+        <p:spPr>
+          <a:xfrm>
+            <a:off x="912482" y="1424066"/>
+            <a:ext cx="7399132" cy="5463645"/>
+          </a:xfrm>
+        </p:spPr>
         <p:txBody>
           <a:bodyPr>
-            <a:normAutofit fontScale="92500" lnSpcReduction="20000"/>
+            <a:normAutofit fontScale="92500" lnSpcReduction="10000"/>
           </a:bodyPr>
           <a:lstStyle/>
           <a:p>
             <a:r>
               <a:rPr lang="en-US" dirty="0" smtClean="0"/>
-              <a:t>You need to know the choices you face. We’ll do that.</a:t>
+              <a:t>You need to know the choices you face because everything is faster. We’ll do that.</a:t>
             </a:r>
           </a:p>
           <a:p>
@@ -6653,14 +9811,14 @@
           <a:p>
             <a:r>
               <a:rPr lang="en-US" dirty="0" smtClean="0"/>
-              <a:t>You’ll need to know how to navigate those choices. We’ll do that, too.</a:t>
+              <a:t>You’ll need to know how to navigate those choices. We’ll do that, too. Arguments welcome.</a:t>
             </a:r>
           </a:p>
           <a:p>
             <a:pPr lvl="1"/>
             <a:r>
               <a:rPr lang="en-US" dirty="0" smtClean="0"/>
-              <a:t>Migrate toward agile </a:t>
+              <a:t>Migrate – do not sprint -- toward agile </a:t>
             </a:r>
             <a:r>
               <a:rPr lang="en-US" dirty="0" err="1" smtClean="0"/>
@@ -6668,7 +9826,7 @@
             </a:r>
             <a:r>
               <a:rPr lang="en-US" dirty="0" smtClean="0"/>
-              <a:t> and </a:t>
+              <a:t> workflows and </a:t>
             </a:r>
             <a:r>
               <a:rPr lang="en-US" dirty="0" err="1" smtClean="0"/>
@@ -6676,14 +9834,14 @@
             </a:r>
             <a:r>
               <a:rPr lang="en-US" dirty="0" smtClean="0"/>
-              <a:t> approach</a:t>
+              <a:t> architecture approach</a:t>
             </a:r>
           </a:p>
           <a:p>
             <a:pPr lvl="1"/>
             <a:r>
               <a:rPr lang="en-US" dirty="0" smtClean="0"/>
-              <a:t>Automate, orchestrate, monitor.</a:t>
+              <a:t>Automate, orchestrate, monitor</a:t>
             </a:r>
           </a:p>
           <a:p>
@@ -6697,11 +9855,14 @@
             <a:pPr lvl="1"/>
             <a:r>
               <a:rPr lang="en-US" dirty="0" smtClean="0"/>
-              <a:t>Choose a great partner, but </a:t>
-            </a:r>
-            <a:r>
-              <a:rPr lang="en-US" smtClean="0"/>
-              <a:t>have several.</a:t>
+              <a:t>Choose a great partner, but have more than one</a:t>
+            </a:r>
+          </a:p>
+          <a:p>
+            <a:pPr lvl="1"/>
+            <a:r>
+              <a:rPr lang="en-US" dirty="0" smtClean="0"/>
+              <a:t>Security first</a:t>
             </a:r>
             <a:endParaRPr lang="en-US" dirty="0"/>
           </a:p>

</xml_diff>